<commit_message>
Minor Changes in Local and Global Control design and results generation codes
</commit_message>
<xml_diff>
--- a/Results/Powepoint_Results.pptx
+++ b/Results/Powepoint_Results.pptx
@@ -34,6 +34,7 @@
     <p:sldId id="272" r:id="rId29"/>
     <p:sldId id="273" r:id="rId30"/>
     <p:sldId id="274" r:id="rId31"/>
+    <p:sldId id="275" r:id="rId32"/>
   </p:sldIdLst>
   <p:sldSz cx="12192000" cy="6858000"/>
   <p:notesSz cx="7559675" cy="10691813"/>
@@ -70,7 +71,7 @@
         <p:spPr>
           <a:xfrm>
             <a:off x="838080" y="365040"/>
-            <a:ext cx="10514880" cy="1324800"/>
+            <a:ext cx="10514520" cy="1324440"/>
           </a:xfrm>
           <a:prstGeom prst="rect">
             <a:avLst/>
@@ -85,14 +86,14 @@
             <a:noAutofit/>
           </a:bodyPr>
           <a:p>
-            <a:pPr indent="0">
+            <a:pPr indent="0" algn="ctr">
               <a:buNone/>
             </a:pPr>
-            <a:endParaRPr b="0" lang="en-US" sz="1800" spc="-1" strike="noStrike">
-              <a:solidFill>
-                <a:schemeClr val="dk1"/>
-              </a:solidFill>
-              <a:latin typeface="Aptos"/>
+            <a:endParaRPr b="0" lang="en-US" sz="4400" spc="-1" strike="noStrike">
+              <a:solidFill>
+                <a:srgbClr val="000000"/>
+              </a:solidFill>
+              <a:latin typeface="Arial"/>
             </a:endParaRPr>
           </a:p>
         </p:txBody>
@@ -110,7 +111,7 @@
         <p:spPr>
           <a:xfrm>
             <a:off x="838080" y="1825560"/>
-            <a:ext cx="10514880" cy="4350600"/>
+            <a:ext cx="10514520" cy="4350240"/>
           </a:xfrm>
           <a:prstGeom prst="rect">
             <a:avLst/>
@@ -171,7 +172,7 @@
         <p:txBody>
           <a:bodyPr/>
           <a:p>
-            <a:fld id="{A2ECF0AF-88F5-4911-BCFB-2A120F340321}" type="slidenum">
+            <a:fld id="{3FC314CC-CCD3-4F14-8349-CCE58E215123}" type="slidenum">
               <a:t>&lt;#&gt;</a:t>
             </a:fld>
           </a:p>
@@ -254,7 +255,7 @@
         <p:txBody>
           <a:bodyPr/>
           <a:p>
-            <a:fld id="{8DD76DAA-4E19-49A5-92AB-1605FC5FFFDC}" type="slidenum">
+            <a:fld id="{AC0BDAF4-3EAA-40BB-A02F-807C010ECF46}" type="slidenum">
               <a:t>&lt;#&gt;</a:t>
             </a:fld>
           </a:p>
@@ -337,7 +338,7 @@
         <p:txBody>
           <a:bodyPr/>
           <a:p>
-            <a:fld id="{0E65B2F2-9E36-4B0C-8676-6277E5085193}" type="slidenum">
+            <a:fld id="{08C326C9-3B07-4145-BE33-03A0E491A578}" type="slidenum">
               <a:t>&lt;#&gt;</a:t>
             </a:fld>
           </a:p>
@@ -420,7 +421,7 @@
         <p:txBody>
           <a:bodyPr/>
           <a:p>
-            <a:fld id="{C6E2EBD7-55BB-4538-BD3A-4147C1CBA190}" type="slidenum">
+            <a:fld id="{BB5E808A-B7E8-42EC-B600-192F6A2AA777}" type="slidenum">
               <a:t>&lt;#&gt;</a:t>
             </a:fld>
           </a:p>
@@ -503,7 +504,7 @@
         <p:txBody>
           <a:bodyPr/>
           <a:p>
-            <a:fld id="{5B74338B-DE7D-4FD2-A499-B3CA80B4DA31}" type="slidenum">
+            <a:fld id="{FDC8AFF1-8605-4DF4-A7C8-AD397A704CEA}" type="slidenum">
               <a:t>&lt;#&gt;</a:t>
             </a:fld>
           </a:p>
@@ -565,7 +566,7 @@
         <p:spPr>
           <a:xfrm>
             <a:off x="838080" y="365040"/>
-            <a:ext cx="10514880" cy="1324800"/>
+            <a:ext cx="10514520" cy="1324440"/>
           </a:xfrm>
           <a:prstGeom prst="rect">
             <a:avLst/>
@@ -580,14 +581,14 @@
             <a:noAutofit/>
           </a:bodyPr>
           <a:p>
-            <a:pPr indent="0">
+            <a:pPr indent="0" algn="ctr">
               <a:buNone/>
             </a:pPr>
-            <a:endParaRPr b="0" lang="en-US" sz="1800" spc="-1" strike="noStrike">
-              <a:solidFill>
-                <a:schemeClr val="dk1"/>
-              </a:solidFill>
-              <a:latin typeface="Aptos"/>
+            <a:endParaRPr b="0" lang="en-US" sz="4400" spc="-1" strike="noStrike">
+              <a:solidFill>
+                <a:srgbClr val="000000"/>
+              </a:solidFill>
+              <a:latin typeface="Arial"/>
             </a:endParaRPr>
           </a:p>
         </p:txBody>
@@ -605,7 +606,7 @@
         <p:spPr>
           <a:xfrm>
             <a:off x="838080" y="1825560"/>
-            <a:ext cx="10514880" cy="4350600"/>
+            <a:ext cx="10514520" cy="4350240"/>
           </a:xfrm>
           <a:prstGeom prst="rect">
             <a:avLst/>
@@ -621,19 +622,16 @@
           </a:bodyPr>
           <a:p>
             <a:pPr indent="0">
-              <a:lnSpc>
-                <a:spcPct val="90000"/>
-              </a:lnSpc>
               <a:spcBef>
                 <a:spcPts val="1417"/>
               </a:spcBef>
               <a:buNone/>
             </a:pPr>
-            <a:endParaRPr b="0" lang="en-US" sz="2800" spc="-1" strike="noStrike">
-              <a:solidFill>
-                <a:schemeClr val="dk1"/>
-              </a:solidFill>
-              <a:latin typeface="Aptos"/>
+            <a:endParaRPr b="0" lang="en-US" sz="3200" spc="-1" strike="noStrike">
+              <a:solidFill>
+                <a:srgbClr val="000000"/>
+              </a:solidFill>
+              <a:latin typeface="Arial"/>
             </a:endParaRPr>
           </a:p>
         </p:txBody>
@@ -672,7 +670,7 @@
         <p:txBody>
           <a:bodyPr/>
           <a:p>
-            <a:fld id="{44B3A1A0-F884-497F-AB11-9EDAEF071E1F}" type="slidenum">
+            <a:fld id="{8681E1C7-2311-4942-93B4-F5F8541D6ACE}" type="slidenum">
               <a:t>&lt;#&gt;</a:t>
             </a:fld>
           </a:p>
@@ -755,7 +753,7 @@
         <p:txBody>
           <a:bodyPr/>
           <a:p>
-            <a:fld id="{2FA3CE0E-E86D-434B-BB65-FB8E8635EF49}" type="slidenum">
+            <a:fld id="{2F52AFEC-844D-4470-A632-A7E204B64166}" type="slidenum">
               <a:t>&lt;#&gt;</a:t>
             </a:fld>
           </a:p>
@@ -817,7 +815,7 @@
         <p:spPr>
           <a:xfrm>
             <a:off x="838080" y="365040"/>
-            <a:ext cx="10514880" cy="1324800"/>
+            <a:ext cx="10514520" cy="1324440"/>
           </a:xfrm>
           <a:prstGeom prst="rect">
             <a:avLst/>
@@ -832,14 +830,14 @@
             <a:noAutofit/>
           </a:bodyPr>
           <a:p>
-            <a:pPr indent="0">
+            <a:pPr indent="0" algn="ctr">
               <a:buNone/>
             </a:pPr>
-            <a:endParaRPr b="0" lang="en-US" sz="1800" spc="-1" strike="noStrike">
-              <a:solidFill>
-                <a:schemeClr val="dk1"/>
-              </a:solidFill>
-              <a:latin typeface="Aptos"/>
+            <a:endParaRPr b="0" lang="en-US" sz="4400" spc="-1" strike="noStrike">
+              <a:solidFill>
+                <a:srgbClr val="000000"/>
+              </a:solidFill>
+              <a:latin typeface="Arial"/>
             </a:endParaRPr>
           </a:p>
         </p:txBody>
@@ -857,7 +855,7 @@
         <p:spPr>
           <a:xfrm>
             <a:off x="838080" y="1825560"/>
-            <a:ext cx="5131080" cy="4350600"/>
+            <a:ext cx="5131080" cy="4350240"/>
           </a:xfrm>
           <a:prstGeom prst="rect">
             <a:avLst/>
@@ -873,19 +871,16 @@
           </a:bodyPr>
           <a:p>
             <a:pPr indent="0">
-              <a:lnSpc>
-                <a:spcPct val="90000"/>
-              </a:lnSpc>
               <a:spcBef>
                 <a:spcPts val="1417"/>
               </a:spcBef>
               <a:buNone/>
             </a:pPr>
-            <a:endParaRPr b="0" lang="en-US" sz="2800" spc="-1" strike="noStrike">
-              <a:solidFill>
-                <a:schemeClr val="dk1"/>
-              </a:solidFill>
-              <a:latin typeface="Aptos"/>
+            <a:endParaRPr b="0" lang="en-US" sz="3200" spc="-1" strike="noStrike">
+              <a:solidFill>
+                <a:srgbClr val="000000"/>
+              </a:solidFill>
+              <a:latin typeface="Arial"/>
             </a:endParaRPr>
           </a:p>
         </p:txBody>
@@ -903,7 +898,7 @@
         <p:spPr>
           <a:xfrm>
             <a:off x="6226200" y="1825560"/>
-            <a:ext cx="5131080" cy="4350600"/>
+            <a:ext cx="5131080" cy="4350240"/>
           </a:xfrm>
           <a:prstGeom prst="rect">
             <a:avLst/>
@@ -919,19 +914,16 @@
           </a:bodyPr>
           <a:p>
             <a:pPr indent="0">
-              <a:lnSpc>
-                <a:spcPct val="90000"/>
-              </a:lnSpc>
               <a:spcBef>
                 <a:spcPts val="1417"/>
               </a:spcBef>
               <a:buNone/>
             </a:pPr>
-            <a:endParaRPr b="0" lang="en-US" sz="2800" spc="-1" strike="noStrike">
-              <a:solidFill>
-                <a:schemeClr val="dk1"/>
-              </a:solidFill>
-              <a:latin typeface="Aptos"/>
+            <a:endParaRPr b="0" lang="en-US" sz="3200" spc="-1" strike="noStrike">
+              <a:solidFill>
+                <a:srgbClr val="000000"/>
+              </a:solidFill>
+              <a:latin typeface="Arial"/>
             </a:endParaRPr>
           </a:p>
         </p:txBody>
@@ -970,7 +962,7 @@
         <p:txBody>
           <a:bodyPr/>
           <a:p>
-            <a:fld id="{310B91FE-5FDB-43D3-9C86-28CAAEF5E466}" type="slidenum">
+            <a:fld id="{C973BD74-DD09-4015-A123-B1A67183F4B1}" type="slidenum">
               <a:t>&lt;#&gt;</a:t>
             </a:fld>
           </a:p>
@@ -1053,7 +1045,7 @@
         <p:txBody>
           <a:bodyPr/>
           <a:p>
-            <a:fld id="{17570087-76DF-436D-9CAE-350E330CB502}" type="slidenum">
+            <a:fld id="{6EEFDEA7-8613-4124-B10F-C7B6DBE5FFC6}" type="slidenum">
               <a:t>&lt;#&gt;</a:t>
             </a:fld>
           </a:p>
@@ -1115,7 +1107,7 @@
         <p:spPr>
           <a:xfrm>
             <a:off x="838080" y="365040"/>
-            <a:ext cx="10514880" cy="1324800"/>
+            <a:ext cx="10514520" cy="1324440"/>
           </a:xfrm>
           <a:prstGeom prst="rect">
             <a:avLst/>
@@ -1130,14 +1122,14 @@
             <a:noAutofit/>
           </a:bodyPr>
           <a:p>
-            <a:pPr indent="0">
+            <a:pPr indent="0" algn="ctr">
               <a:buNone/>
             </a:pPr>
-            <a:endParaRPr b="0" lang="en-US" sz="1800" spc="-1" strike="noStrike">
-              <a:solidFill>
-                <a:schemeClr val="dk1"/>
-              </a:solidFill>
-              <a:latin typeface="Aptos"/>
+            <a:endParaRPr b="0" lang="en-US" sz="4400" spc="-1" strike="noStrike">
+              <a:solidFill>
+                <a:srgbClr val="000000"/>
+              </a:solidFill>
+              <a:latin typeface="Arial"/>
             </a:endParaRPr>
           </a:p>
         </p:txBody>
@@ -1176,7 +1168,7 @@
         <p:txBody>
           <a:bodyPr/>
           <a:p>
-            <a:fld id="{A5EC08DA-B334-4951-931D-2AEBF051839F}" type="slidenum">
+            <a:fld id="{7EFB0BF2-7334-4A10-B89F-37012415C01C}" type="slidenum">
               <a:t>&lt;#&gt;</a:t>
             </a:fld>
           </a:p>
@@ -1259,7 +1251,7 @@
         <p:txBody>
           <a:bodyPr/>
           <a:p>
-            <a:fld id="{AF0DE01C-CCD6-4F91-8ADA-1AD6E9063F3C}" type="slidenum">
+            <a:fld id="{3CAA39C3-7326-4CF9-959F-AB224316F9E1}" type="slidenum">
               <a:t>&lt;#&gt;</a:t>
             </a:fld>
           </a:p>
@@ -1328,7 +1320,7 @@
         <p:spPr>
           <a:xfrm>
             <a:off x="838080" y="365040"/>
-            <a:ext cx="10514880" cy="1324800"/>
+            <a:ext cx="10514520" cy="1324440"/>
           </a:xfrm>
           <a:prstGeom prst="rect">
             <a:avLst/>
@@ -1347,19 +1339,19 @@
               <a:buNone/>
             </a:pPr>
             <a:r>
-              <a:rPr b="0" lang="en-US" sz="4400" spc="-1" strike="noStrike">
-                <a:solidFill>
-                  <a:schemeClr val="dk1"/>
-                </a:solidFill>
-                <a:latin typeface="Aptos"/>
+              <a:rPr b="0" lang="en-US" sz="1800" spc="-1" strike="noStrike">
+                <a:solidFill>
+                  <a:srgbClr val="000000"/>
+                </a:solidFill>
+                <a:latin typeface="Arial"/>
               </a:rPr>
               <a:t>Click to edit the title text format</a:t>
             </a:r>
-            <a:endParaRPr b="0" lang="en-US" sz="4400" spc="-1" strike="noStrike">
-              <a:solidFill>
-                <a:schemeClr val="dk1"/>
-              </a:solidFill>
-              <a:latin typeface="Aptos"/>
+            <a:endParaRPr b="0" lang="en-US" sz="1800" spc="-1" strike="noStrike">
+              <a:solidFill>
+                <a:srgbClr val="000000"/>
+              </a:solidFill>
+              <a:latin typeface="Arial"/>
             </a:endParaRPr>
           </a:p>
         </p:txBody>
@@ -1377,7 +1369,7 @@
         <p:spPr>
           <a:xfrm>
             <a:off x="4038480" y="6356520"/>
-            <a:ext cx="4114080" cy="364320"/>
+            <a:ext cx="4113720" cy="363960"/>
           </a:xfrm>
           <a:prstGeom prst="rect">
             <a:avLst/>
@@ -1449,7 +1441,7 @@
         <p:spPr>
           <a:xfrm>
             <a:off x="8610480" y="6356520"/>
-            <a:ext cx="2742480" cy="364320"/>
+            <a:ext cx="2742120" cy="363960"/>
           </a:xfrm>
           <a:prstGeom prst="rect">
             <a:avLst/>
@@ -1492,7 +1484,7 @@
                 <a:tab algn="l" pos="0"/>
               </a:tabLst>
             </a:pPr>
-            <a:fld id="{C8865BCF-F539-482C-8AA8-09FD986284D0}" type="slidenum">
+            <a:fld id="{1C20209D-99A7-4CEF-A41A-420444D47E4E}" type="slidenum">
               <a:rPr b="0" lang="en-US" sz="1200" spc="-1" strike="noStrike">
                 <a:solidFill>
                   <a:schemeClr val="dk1">
@@ -1525,7 +1517,7 @@
         <p:spPr>
           <a:xfrm>
             <a:off x="838080" y="6356520"/>
-            <a:ext cx="2742480" cy="364320"/>
+            <a:ext cx="2742120" cy="363960"/>
           </a:xfrm>
           <a:prstGeom prst="rect">
             <a:avLst/>
@@ -1601,9 +1593,6 @@
           </a:bodyPr>
           <a:p>
             <a:pPr marL="432000" indent="-324000">
-              <a:lnSpc>
-                <a:spcPct val="90000"/>
-              </a:lnSpc>
               <a:spcBef>
                 <a:spcPts val="1417"/>
               </a:spcBef>
@@ -1615,26 +1604,23 @@
               <a:buChar char=""/>
             </a:pPr>
             <a:r>
-              <a:rPr b="0" lang="en-US" sz="2800" spc="-1" strike="noStrike">
-                <a:solidFill>
-                  <a:schemeClr val="dk1"/>
-                </a:solidFill>
-                <a:latin typeface="Aptos"/>
+              <a:rPr b="0" lang="en-US" sz="3200" spc="-1" strike="noStrike">
+                <a:solidFill>
+                  <a:srgbClr val="000000"/>
+                </a:solidFill>
+                <a:latin typeface="Arial"/>
               </a:rPr>
               <a:t>Click to edit the outline text format</a:t>
             </a:r>
-            <a:endParaRPr b="0" lang="en-US" sz="2800" spc="-1" strike="noStrike">
-              <a:solidFill>
-                <a:schemeClr val="dk1"/>
-              </a:solidFill>
-              <a:latin typeface="Aptos"/>
+            <a:endParaRPr b="0" lang="en-US" sz="3200" spc="-1" strike="noStrike">
+              <a:solidFill>
+                <a:srgbClr val="000000"/>
+              </a:solidFill>
+              <a:latin typeface="Arial"/>
             </a:endParaRPr>
           </a:p>
           <a:p>
             <a:pPr lvl="1" marL="864000" indent="-324000">
-              <a:lnSpc>
-                <a:spcPct val="90000"/>
-              </a:lnSpc>
               <a:spcBef>
                 <a:spcPts val="1134"/>
               </a:spcBef>
@@ -1646,26 +1632,23 @@
               <a:buChar char=""/>
             </a:pPr>
             <a:r>
-              <a:rPr b="0" lang="en-US" sz="2000" spc="-1" strike="noStrike">
-                <a:solidFill>
-                  <a:schemeClr val="dk1"/>
-                </a:solidFill>
-                <a:latin typeface="Aptos"/>
+              <a:rPr b="0" lang="en-US" sz="2800" spc="-1" strike="noStrike">
+                <a:solidFill>
+                  <a:srgbClr val="000000"/>
+                </a:solidFill>
+                <a:latin typeface="Arial"/>
               </a:rPr>
               <a:t>Second Outline Level</a:t>
             </a:r>
-            <a:endParaRPr b="0" lang="en-US" sz="2000" spc="-1" strike="noStrike">
-              <a:solidFill>
-                <a:schemeClr val="dk1"/>
-              </a:solidFill>
-              <a:latin typeface="Aptos"/>
+            <a:endParaRPr b="0" lang="en-US" sz="2800" spc="-1" strike="noStrike">
+              <a:solidFill>
+                <a:srgbClr val="000000"/>
+              </a:solidFill>
+              <a:latin typeface="Arial"/>
             </a:endParaRPr>
           </a:p>
           <a:p>
             <a:pPr lvl="2" marL="1296000" indent="-288000">
-              <a:lnSpc>
-                <a:spcPct val="90000"/>
-              </a:lnSpc>
               <a:spcBef>
                 <a:spcPts val="850"/>
               </a:spcBef>
@@ -1677,26 +1660,23 @@
               <a:buChar char=""/>
             </a:pPr>
             <a:r>
-              <a:rPr b="0" lang="en-US" sz="1800" spc="-1" strike="noStrike">
-                <a:solidFill>
-                  <a:schemeClr val="dk1"/>
-                </a:solidFill>
-                <a:latin typeface="Aptos"/>
+              <a:rPr b="0" lang="en-US" sz="2400" spc="-1" strike="noStrike">
+                <a:solidFill>
+                  <a:srgbClr val="000000"/>
+                </a:solidFill>
+                <a:latin typeface="Arial"/>
               </a:rPr>
               <a:t>Third Outline Level</a:t>
             </a:r>
-            <a:endParaRPr b="0" lang="en-US" sz="1800" spc="-1" strike="noStrike">
-              <a:solidFill>
-                <a:schemeClr val="dk1"/>
-              </a:solidFill>
-              <a:latin typeface="Aptos"/>
+            <a:endParaRPr b="0" lang="en-US" sz="2400" spc="-1" strike="noStrike">
+              <a:solidFill>
+                <a:srgbClr val="000000"/>
+              </a:solidFill>
+              <a:latin typeface="Arial"/>
             </a:endParaRPr>
           </a:p>
           <a:p>
             <a:pPr lvl="3" marL="1728000" indent="-216000">
-              <a:lnSpc>
-                <a:spcPct val="90000"/>
-              </a:lnSpc>
               <a:spcBef>
                 <a:spcPts val="567"/>
               </a:spcBef>
@@ -1708,26 +1688,23 @@
               <a:buChar char=""/>
             </a:pPr>
             <a:r>
-              <a:rPr b="0" lang="en-US" sz="1800" spc="-1" strike="noStrike">
-                <a:solidFill>
-                  <a:schemeClr val="dk1"/>
-                </a:solidFill>
-                <a:latin typeface="Aptos"/>
+              <a:rPr b="0" lang="en-US" sz="2000" spc="-1" strike="noStrike">
+                <a:solidFill>
+                  <a:srgbClr val="000000"/>
+                </a:solidFill>
+                <a:latin typeface="Arial"/>
               </a:rPr>
               <a:t>Fourth Outline Level</a:t>
             </a:r>
-            <a:endParaRPr b="0" lang="en-US" sz="1800" spc="-1" strike="noStrike">
-              <a:solidFill>
-                <a:schemeClr val="dk1"/>
-              </a:solidFill>
-              <a:latin typeface="Aptos"/>
+            <a:endParaRPr b="0" lang="en-US" sz="2000" spc="-1" strike="noStrike">
+              <a:solidFill>
+                <a:srgbClr val="000000"/>
+              </a:solidFill>
+              <a:latin typeface="Arial"/>
             </a:endParaRPr>
           </a:p>
           <a:p>
             <a:pPr lvl="4" marL="2160000" indent="-216000">
-              <a:lnSpc>
-                <a:spcPct val="90000"/>
-              </a:lnSpc>
               <a:spcBef>
                 <a:spcPts val="283"/>
               </a:spcBef>
@@ -1741,24 +1718,21 @@
             <a:r>
               <a:rPr b="0" lang="en-US" sz="2000" spc="-1" strike="noStrike">
                 <a:solidFill>
-                  <a:schemeClr val="dk1"/>
-                </a:solidFill>
-                <a:latin typeface="Aptos"/>
+                  <a:srgbClr val="000000"/>
+                </a:solidFill>
+                <a:latin typeface="Arial"/>
               </a:rPr>
               <a:t>Fifth Outline Level</a:t>
             </a:r>
             <a:endParaRPr b="0" lang="en-US" sz="2000" spc="-1" strike="noStrike">
               <a:solidFill>
-                <a:schemeClr val="dk1"/>
-              </a:solidFill>
-              <a:latin typeface="Aptos"/>
+                <a:srgbClr val="000000"/>
+              </a:solidFill>
+              <a:latin typeface="Arial"/>
             </a:endParaRPr>
           </a:p>
           <a:p>
             <a:pPr lvl="5" marL="2592000" indent="-216000">
-              <a:lnSpc>
-                <a:spcPct val="90000"/>
-              </a:lnSpc>
               <a:spcBef>
                 <a:spcPts val="283"/>
               </a:spcBef>
@@ -1772,24 +1746,21 @@
             <a:r>
               <a:rPr b="0" lang="en-US" sz="2000" spc="-1" strike="noStrike">
                 <a:solidFill>
-                  <a:schemeClr val="dk1"/>
-                </a:solidFill>
-                <a:latin typeface="Aptos"/>
+                  <a:srgbClr val="000000"/>
+                </a:solidFill>
+                <a:latin typeface="Arial"/>
               </a:rPr>
               <a:t>Sixth Outline Level</a:t>
             </a:r>
             <a:endParaRPr b="0" lang="en-US" sz="2000" spc="-1" strike="noStrike">
               <a:solidFill>
-                <a:schemeClr val="dk1"/>
-              </a:solidFill>
-              <a:latin typeface="Aptos"/>
+                <a:srgbClr val="000000"/>
+              </a:solidFill>
+              <a:latin typeface="Arial"/>
             </a:endParaRPr>
           </a:p>
           <a:p>
             <a:pPr lvl="6" marL="3024000" indent="-216000">
-              <a:lnSpc>
-                <a:spcPct val="90000"/>
-              </a:lnSpc>
               <a:spcBef>
                 <a:spcPts val="283"/>
               </a:spcBef>
@@ -1803,17 +1774,17 @@
             <a:r>
               <a:rPr b="0" lang="en-US" sz="2000" spc="-1" strike="noStrike">
                 <a:solidFill>
-                  <a:schemeClr val="dk1"/>
-                </a:solidFill>
-                <a:latin typeface="Aptos"/>
+                  <a:srgbClr val="000000"/>
+                </a:solidFill>
+                <a:latin typeface="Arial"/>
               </a:rPr>
               <a:t>Seventh Outline Level</a:t>
             </a:r>
             <a:endParaRPr b="0" lang="en-US" sz="2000" spc="-1" strike="noStrike">
               <a:solidFill>
-                <a:schemeClr val="dk1"/>
-              </a:solidFill>
-              <a:latin typeface="Aptos"/>
+                <a:srgbClr val="000000"/>
+              </a:solidFill>
+              <a:latin typeface="Arial"/>
             </a:endParaRPr>
           </a:p>
         </p:txBody>
@@ -1864,7 +1835,7 @@
         <p:spPr>
           <a:xfrm>
             <a:off x="4038480" y="6356520"/>
-            <a:ext cx="4114080" cy="364320"/>
+            <a:ext cx="4113720" cy="363960"/>
           </a:xfrm>
           <a:prstGeom prst="rect">
             <a:avLst/>
@@ -1936,7 +1907,7 @@
         <p:spPr>
           <a:xfrm>
             <a:off x="8610480" y="6356520"/>
-            <a:ext cx="2742480" cy="364320"/>
+            <a:ext cx="2742120" cy="363960"/>
           </a:xfrm>
           <a:prstGeom prst="rect">
             <a:avLst/>
@@ -1979,7 +1950,7 @@
                 <a:tab algn="l" pos="0"/>
               </a:tabLst>
             </a:pPr>
-            <a:fld id="{6E83512C-1E3E-467D-9F08-ED52B6E84673}" type="slidenum">
+            <a:fld id="{F560B50A-38A2-402E-B72C-D28B6F58C88C}" type="slidenum">
               <a:rPr b="0" lang="en-US" sz="1200" spc="-1" strike="noStrike">
                 <a:solidFill>
                   <a:schemeClr val="dk1">
@@ -2012,7 +1983,7 @@
         <p:spPr>
           <a:xfrm>
             <a:off x="838080" y="6356520"/>
-            <a:ext cx="2742480" cy="364320"/>
+            <a:ext cx="2742120" cy="363960"/>
           </a:xfrm>
           <a:prstGeom prst="rect">
             <a:avLst/>
@@ -2105,7 +2076,7 @@
         <p:spPr>
           <a:xfrm>
             <a:off x="4038480" y="6356520"/>
-            <a:ext cx="4114080" cy="364320"/>
+            <a:ext cx="4113720" cy="363960"/>
           </a:xfrm>
           <a:prstGeom prst="rect">
             <a:avLst/>
@@ -2177,7 +2148,7 @@
         <p:spPr>
           <a:xfrm>
             <a:off x="8610480" y="6356520"/>
-            <a:ext cx="2742480" cy="364320"/>
+            <a:ext cx="2742120" cy="363960"/>
           </a:xfrm>
           <a:prstGeom prst="rect">
             <a:avLst/>
@@ -2220,7 +2191,7 @@
                 <a:tab algn="l" pos="0"/>
               </a:tabLst>
             </a:pPr>
-            <a:fld id="{F38701D1-5C23-4A71-AFAC-CFF727A22510}" type="slidenum">
+            <a:fld id="{56A510EF-2010-4C5C-BF3A-083181DF2C86}" type="slidenum">
               <a:rPr b="0" lang="en-US" sz="1200" spc="-1" strike="noStrike">
                 <a:solidFill>
                   <a:schemeClr val="dk1">
@@ -2253,7 +2224,7 @@
         <p:spPr>
           <a:xfrm>
             <a:off x="838080" y="6356520"/>
-            <a:ext cx="2742480" cy="364320"/>
+            <a:ext cx="2742120" cy="363960"/>
           </a:xfrm>
           <a:prstGeom prst="rect">
             <a:avLst/>
@@ -2346,7 +2317,7 @@
         <p:spPr>
           <a:xfrm>
             <a:off x="4038480" y="6356520"/>
-            <a:ext cx="4114080" cy="364320"/>
+            <a:ext cx="4113720" cy="363960"/>
           </a:xfrm>
           <a:prstGeom prst="rect">
             <a:avLst/>
@@ -2418,7 +2389,7 @@
         <p:spPr>
           <a:xfrm>
             <a:off x="8610480" y="6356520"/>
-            <a:ext cx="2742480" cy="364320"/>
+            <a:ext cx="2742120" cy="363960"/>
           </a:xfrm>
           <a:prstGeom prst="rect">
             <a:avLst/>
@@ -2461,7 +2432,7 @@
                 <a:tab algn="l" pos="0"/>
               </a:tabLst>
             </a:pPr>
-            <a:fld id="{6CD0D5B2-C52A-4B76-B06F-2F07281EE79D}" type="slidenum">
+            <a:fld id="{64BE1451-EA9D-4FA5-B840-1D2A95334BB6}" type="slidenum">
               <a:rPr b="0" lang="en-US" sz="1200" spc="-1" strike="noStrike">
                 <a:solidFill>
                   <a:schemeClr val="dk1">
@@ -2494,7 +2465,7 @@
         <p:spPr>
           <a:xfrm>
             <a:off x="838080" y="6356520"/>
-            <a:ext cx="2742480" cy="364320"/>
+            <a:ext cx="2742120" cy="363960"/>
           </a:xfrm>
           <a:prstGeom prst="rect">
             <a:avLst/>
@@ -2587,7 +2558,7 @@
         <p:spPr>
           <a:xfrm>
             <a:off x="4038480" y="6356520"/>
-            <a:ext cx="4114080" cy="364320"/>
+            <a:ext cx="4113720" cy="363960"/>
           </a:xfrm>
           <a:prstGeom prst="rect">
             <a:avLst/>
@@ -2659,7 +2630,7 @@
         <p:spPr>
           <a:xfrm>
             <a:off x="8610480" y="6356520"/>
-            <a:ext cx="2742480" cy="364320"/>
+            <a:ext cx="2742120" cy="363960"/>
           </a:xfrm>
           <a:prstGeom prst="rect">
             <a:avLst/>
@@ -2702,7 +2673,7 @@
                 <a:tab algn="l" pos="0"/>
               </a:tabLst>
             </a:pPr>
-            <a:fld id="{BA4AD89C-09D1-4495-9DB0-D9110D7F90A4}" type="slidenum">
+            <a:fld id="{CFEF30A5-0278-4BA0-B0A4-830973C80920}" type="slidenum">
               <a:rPr b="0" lang="en-US" sz="1200" spc="-1" strike="noStrike">
                 <a:solidFill>
                   <a:schemeClr val="dk1">
@@ -2735,7 +2706,7 @@
         <p:spPr>
           <a:xfrm>
             <a:off x="838080" y="6356520"/>
-            <a:ext cx="2742480" cy="364320"/>
+            <a:ext cx="2742120" cy="363960"/>
           </a:xfrm>
           <a:prstGeom prst="rect">
             <a:avLst/>
@@ -2828,7 +2799,7 @@
         <p:spPr>
           <a:xfrm>
             <a:off x="838080" y="365040"/>
-            <a:ext cx="10514880" cy="1324800"/>
+            <a:ext cx="10514520" cy="1324440"/>
           </a:xfrm>
           <a:prstGeom prst="rect">
             <a:avLst/>
@@ -2847,19 +2818,19 @@
               <a:buNone/>
             </a:pPr>
             <a:r>
-              <a:rPr b="0" lang="en-US" sz="4400" spc="-1" strike="noStrike">
-                <a:solidFill>
-                  <a:schemeClr val="dk1"/>
-                </a:solidFill>
-                <a:latin typeface="Aptos"/>
+              <a:rPr b="0" lang="en-US" sz="1800" spc="-1" strike="noStrike">
+                <a:solidFill>
+                  <a:srgbClr val="000000"/>
+                </a:solidFill>
+                <a:latin typeface="Arial"/>
               </a:rPr>
               <a:t>Click to edit the title text format</a:t>
             </a:r>
-            <a:endParaRPr b="0" lang="en-US" sz="4400" spc="-1" strike="noStrike">
-              <a:solidFill>
-                <a:schemeClr val="dk1"/>
-              </a:solidFill>
-              <a:latin typeface="Aptos"/>
+            <a:endParaRPr b="0" lang="en-US" sz="1800" spc="-1" strike="noStrike">
+              <a:solidFill>
+                <a:srgbClr val="000000"/>
+              </a:solidFill>
+              <a:latin typeface="Arial"/>
             </a:endParaRPr>
           </a:p>
         </p:txBody>
@@ -2877,7 +2848,7 @@
         <p:spPr>
           <a:xfrm>
             <a:off x="838080" y="1825560"/>
-            <a:ext cx="10514880" cy="4350600"/>
+            <a:ext cx="10514520" cy="4350240"/>
           </a:xfrm>
           <a:prstGeom prst="rect">
             <a:avLst/>
@@ -2893,9 +2864,6 @@
           </a:bodyPr>
           <a:p>
             <a:pPr marL="432000" indent="-324000">
-              <a:lnSpc>
-                <a:spcPct val="90000"/>
-              </a:lnSpc>
               <a:spcBef>
                 <a:spcPts val="1417"/>
               </a:spcBef>
@@ -2909,24 +2877,21 @@
             <a:r>
               <a:rPr b="0" lang="en-US" sz="1800" spc="-1" strike="noStrike">
                 <a:solidFill>
-                  <a:schemeClr val="dk1"/>
-                </a:solidFill>
-                <a:latin typeface="Aptos"/>
+                  <a:srgbClr val="000000"/>
+                </a:solidFill>
+                <a:latin typeface="Arial"/>
               </a:rPr>
               <a:t>Click to edit the outline text format</a:t>
             </a:r>
             <a:endParaRPr b="0" lang="en-US" sz="1800" spc="-1" strike="noStrike">
               <a:solidFill>
-                <a:schemeClr val="dk1"/>
-              </a:solidFill>
-              <a:latin typeface="Aptos"/>
+                <a:srgbClr val="000000"/>
+              </a:solidFill>
+              <a:latin typeface="Arial"/>
             </a:endParaRPr>
           </a:p>
           <a:p>
             <a:pPr lvl="1" marL="864000" indent="-324000">
-              <a:lnSpc>
-                <a:spcPct val="90000"/>
-              </a:lnSpc>
               <a:spcBef>
                 <a:spcPts val="1134"/>
               </a:spcBef>
@@ -2940,24 +2905,21 @@
             <a:r>
               <a:rPr b="0" lang="en-US" sz="1800" spc="-1" strike="noStrike">
                 <a:solidFill>
-                  <a:schemeClr val="dk1"/>
-                </a:solidFill>
-                <a:latin typeface="Aptos"/>
+                  <a:srgbClr val="000000"/>
+                </a:solidFill>
+                <a:latin typeface="Arial"/>
               </a:rPr>
               <a:t>Second Outline Level</a:t>
             </a:r>
             <a:endParaRPr b="0" lang="en-US" sz="1800" spc="-1" strike="noStrike">
               <a:solidFill>
-                <a:schemeClr val="dk1"/>
-              </a:solidFill>
-              <a:latin typeface="Aptos"/>
+                <a:srgbClr val="000000"/>
+              </a:solidFill>
+              <a:latin typeface="Arial"/>
             </a:endParaRPr>
           </a:p>
           <a:p>
             <a:pPr lvl="2" marL="1296000" indent="-288000">
-              <a:lnSpc>
-                <a:spcPct val="90000"/>
-              </a:lnSpc>
               <a:spcBef>
                 <a:spcPts val="850"/>
               </a:spcBef>
@@ -2971,24 +2933,21 @@
             <a:r>
               <a:rPr b="0" lang="en-US" sz="1800" spc="-1" strike="noStrike">
                 <a:solidFill>
-                  <a:schemeClr val="dk1"/>
-                </a:solidFill>
-                <a:latin typeface="Aptos"/>
+                  <a:srgbClr val="000000"/>
+                </a:solidFill>
+                <a:latin typeface="Arial"/>
               </a:rPr>
               <a:t>Third Outline Level</a:t>
             </a:r>
             <a:endParaRPr b="0" lang="en-US" sz="1800" spc="-1" strike="noStrike">
               <a:solidFill>
-                <a:schemeClr val="dk1"/>
-              </a:solidFill>
-              <a:latin typeface="Aptos"/>
+                <a:srgbClr val="000000"/>
+              </a:solidFill>
+              <a:latin typeface="Arial"/>
             </a:endParaRPr>
           </a:p>
           <a:p>
             <a:pPr lvl="3" marL="1728000" indent="-216000">
-              <a:lnSpc>
-                <a:spcPct val="90000"/>
-              </a:lnSpc>
               <a:spcBef>
                 <a:spcPts val="567"/>
               </a:spcBef>
@@ -3002,24 +2961,21 @@
             <a:r>
               <a:rPr b="0" lang="en-US" sz="1800" spc="-1" strike="noStrike">
                 <a:solidFill>
-                  <a:schemeClr val="dk1"/>
-                </a:solidFill>
-                <a:latin typeface="Aptos"/>
+                  <a:srgbClr val="000000"/>
+                </a:solidFill>
+                <a:latin typeface="Arial"/>
               </a:rPr>
               <a:t>Fourth Outline Level</a:t>
             </a:r>
             <a:endParaRPr b="0" lang="en-US" sz="1800" spc="-1" strike="noStrike">
               <a:solidFill>
-                <a:schemeClr val="dk1"/>
-              </a:solidFill>
-              <a:latin typeface="Aptos"/>
+                <a:srgbClr val="000000"/>
+              </a:solidFill>
+              <a:latin typeface="Arial"/>
             </a:endParaRPr>
           </a:p>
           <a:p>
             <a:pPr lvl="4" marL="2160000" indent="-216000">
-              <a:lnSpc>
-                <a:spcPct val="90000"/>
-              </a:lnSpc>
               <a:spcBef>
                 <a:spcPts val="283"/>
               </a:spcBef>
@@ -3033,24 +2989,21 @@
             <a:r>
               <a:rPr b="0" lang="en-US" sz="1800" spc="-1" strike="noStrike">
                 <a:solidFill>
-                  <a:schemeClr val="dk1"/>
-                </a:solidFill>
-                <a:latin typeface="Aptos"/>
+                  <a:srgbClr val="000000"/>
+                </a:solidFill>
+                <a:latin typeface="Arial"/>
               </a:rPr>
               <a:t>Fifth Outline Level</a:t>
             </a:r>
             <a:endParaRPr b="0" lang="en-US" sz="1800" spc="-1" strike="noStrike">
               <a:solidFill>
-                <a:schemeClr val="dk1"/>
-              </a:solidFill>
-              <a:latin typeface="Aptos"/>
+                <a:srgbClr val="000000"/>
+              </a:solidFill>
+              <a:latin typeface="Arial"/>
             </a:endParaRPr>
           </a:p>
           <a:p>
             <a:pPr lvl="5" marL="2592000" indent="-216000">
-              <a:lnSpc>
-                <a:spcPct val="90000"/>
-              </a:lnSpc>
               <a:spcBef>
                 <a:spcPts val="283"/>
               </a:spcBef>
@@ -3064,24 +3017,21 @@
             <a:r>
               <a:rPr b="0" lang="en-US" sz="1800" spc="-1" strike="noStrike">
                 <a:solidFill>
-                  <a:schemeClr val="dk1"/>
-                </a:solidFill>
-                <a:latin typeface="Aptos"/>
+                  <a:srgbClr val="000000"/>
+                </a:solidFill>
+                <a:latin typeface="Arial"/>
               </a:rPr>
               <a:t>Sixth Outline Level</a:t>
             </a:r>
             <a:endParaRPr b="0" lang="en-US" sz="1800" spc="-1" strike="noStrike">
               <a:solidFill>
-                <a:schemeClr val="dk1"/>
-              </a:solidFill>
-              <a:latin typeface="Aptos"/>
+                <a:srgbClr val="000000"/>
+              </a:solidFill>
+              <a:latin typeface="Arial"/>
             </a:endParaRPr>
           </a:p>
           <a:p>
             <a:pPr lvl="6" marL="3024000" indent="-216000">
-              <a:lnSpc>
-                <a:spcPct val="90000"/>
-              </a:lnSpc>
               <a:spcBef>
                 <a:spcPts val="283"/>
               </a:spcBef>
@@ -3095,17 +3045,17 @@
             <a:r>
               <a:rPr b="0" lang="en-US" sz="1800" spc="-1" strike="noStrike">
                 <a:solidFill>
-                  <a:schemeClr val="dk1"/>
-                </a:solidFill>
-                <a:latin typeface="Aptos"/>
+                  <a:srgbClr val="000000"/>
+                </a:solidFill>
+                <a:latin typeface="Arial"/>
               </a:rPr>
               <a:t>Seventh Outline Level</a:t>
             </a:r>
             <a:endParaRPr b="0" lang="en-US" sz="1800" spc="-1" strike="noStrike">
               <a:solidFill>
-                <a:schemeClr val="dk1"/>
-              </a:solidFill>
-              <a:latin typeface="Aptos"/>
+                <a:srgbClr val="000000"/>
+              </a:solidFill>
+              <a:latin typeface="Arial"/>
             </a:endParaRPr>
           </a:p>
         </p:txBody>
@@ -3123,7 +3073,7 @@
         <p:spPr>
           <a:xfrm>
             <a:off x="4038480" y="6356520"/>
-            <a:ext cx="4114080" cy="364320"/>
+            <a:ext cx="4113720" cy="363960"/>
           </a:xfrm>
           <a:prstGeom prst="rect">
             <a:avLst/>
@@ -3195,7 +3145,7 @@
         <p:spPr>
           <a:xfrm>
             <a:off x="8610480" y="6356520"/>
-            <a:ext cx="2742480" cy="364320"/>
+            <a:ext cx="2742120" cy="363960"/>
           </a:xfrm>
           <a:prstGeom prst="rect">
             <a:avLst/>
@@ -3238,7 +3188,7 @@
                 <a:tab algn="l" pos="0"/>
               </a:tabLst>
             </a:pPr>
-            <a:fld id="{6A5F6174-46D3-421B-BCC4-AE794C374D60}" type="slidenum">
+            <a:fld id="{1D788602-5DF2-432D-8058-1F3C711F80EA}" type="slidenum">
               <a:rPr b="0" lang="en-US" sz="1200" spc="-1" strike="noStrike">
                 <a:solidFill>
                   <a:schemeClr val="dk1">
@@ -3271,7 +3221,7 @@
         <p:spPr>
           <a:xfrm>
             <a:off x="838080" y="6356520"/>
-            <a:ext cx="2742480" cy="364320"/>
+            <a:ext cx="2742120" cy="363960"/>
           </a:xfrm>
           <a:prstGeom prst="rect">
             <a:avLst/>
@@ -3364,7 +3314,7 @@
         <p:spPr>
           <a:xfrm>
             <a:off x="4038480" y="6356520"/>
-            <a:ext cx="4114080" cy="364320"/>
+            <a:ext cx="4113720" cy="363960"/>
           </a:xfrm>
           <a:prstGeom prst="rect">
             <a:avLst/>
@@ -3436,7 +3386,7 @@
         <p:spPr>
           <a:xfrm>
             <a:off x="8610480" y="6356520"/>
-            <a:ext cx="2742480" cy="364320"/>
+            <a:ext cx="2742120" cy="363960"/>
           </a:xfrm>
           <a:prstGeom prst="rect">
             <a:avLst/>
@@ -3479,7 +3429,7 @@
                 <a:tab algn="l" pos="0"/>
               </a:tabLst>
             </a:pPr>
-            <a:fld id="{905C1018-CC34-4546-82C0-FBF7CE9029A8}" type="slidenum">
+            <a:fld id="{A9B3AC1C-09C8-4967-B7EA-1C31BE63B369}" type="slidenum">
               <a:rPr b="0" lang="en-US" sz="1200" spc="-1" strike="noStrike">
                 <a:solidFill>
                   <a:schemeClr val="dk1">
@@ -3512,7 +3462,7 @@
         <p:spPr>
           <a:xfrm>
             <a:off x="838080" y="6356520"/>
-            <a:ext cx="2742480" cy="364320"/>
+            <a:ext cx="2742120" cy="363960"/>
           </a:xfrm>
           <a:prstGeom prst="rect">
             <a:avLst/>
@@ -3605,7 +3555,7 @@
         <p:spPr>
           <a:xfrm>
             <a:off x="838080" y="365040"/>
-            <a:ext cx="10514880" cy="1324800"/>
+            <a:ext cx="10514520" cy="1324440"/>
           </a:xfrm>
           <a:prstGeom prst="rect">
             <a:avLst/>
@@ -3624,19 +3574,19 @@
               <a:buNone/>
             </a:pPr>
             <a:r>
-              <a:rPr b="0" lang="en-US" sz="4400" spc="-1" strike="noStrike">
-                <a:solidFill>
-                  <a:schemeClr val="dk1"/>
-                </a:solidFill>
-                <a:latin typeface="Aptos"/>
+              <a:rPr b="0" lang="en-US" sz="1800" spc="-1" strike="noStrike">
+                <a:solidFill>
+                  <a:srgbClr val="000000"/>
+                </a:solidFill>
+                <a:latin typeface="Arial"/>
               </a:rPr>
               <a:t>Click to edit the title text format</a:t>
             </a:r>
-            <a:endParaRPr b="0" lang="en-US" sz="4400" spc="-1" strike="noStrike">
-              <a:solidFill>
-                <a:schemeClr val="dk1"/>
-              </a:solidFill>
-              <a:latin typeface="Aptos"/>
+            <a:endParaRPr b="0" lang="en-US" sz="1800" spc="-1" strike="noStrike">
+              <a:solidFill>
+                <a:srgbClr val="000000"/>
+              </a:solidFill>
+              <a:latin typeface="Arial"/>
             </a:endParaRPr>
           </a:p>
         </p:txBody>
@@ -3654,7 +3604,7 @@
         <p:spPr>
           <a:xfrm>
             <a:off x="838080" y="1825560"/>
-            <a:ext cx="5130720" cy="4350600"/>
+            <a:ext cx="5130720" cy="4350240"/>
           </a:xfrm>
           <a:prstGeom prst="rect">
             <a:avLst/>
@@ -3670,9 +3620,6 @@
           </a:bodyPr>
           <a:p>
             <a:pPr marL="432000" indent="-324000">
-              <a:lnSpc>
-                <a:spcPct val="90000"/>
-              </a:lnSpc>
               <a:spcBef>
                 <a:spcPts val="1417"/>
               </a:spcBef>
@@ -3686,24 +3633,21 @@
             <a:r>
               <a:rPr b="0" lang="en-US" sz="1800" spc="-1" strike="noStrike">
                 <a:solidFill>
-                  <a:schemeClr val="dk1"/>
-                </a:solidFill>
-                <a:latin typeface="Aptos"/>
+                  <a:srgbClr val="000000"/>
+                </a:solidFill>
+                <a:latin typeface="Arial"/>
               </a:rPr>
               <a:t>Click to edit the outline text format</a:t>
             </a:r>
             <a:endParaRPr b="0" lang="en-US" sz="1800" spc="-1" strike="noStrike">
               <a:solidFill>
-                <a:schemeClr val="dk1"/>
-              </a:solidFill>
-              <a:latin typeface="Aptos"/>
+                <a:srgbClr val="000000"/>
+              </a:solidFill>
+              <a:latin typeface="Arial"/>
             </a:endParaRPr>
           </a:p>
           <a:p>
             <a:pPr lvl="1" marL="864000" indent="-324000">
-              <a:lnSpc>
-                <a:spcPct val="90000"/>
-              </a:lnSpc>
               <a:spcBef>
                 <a:spcPts val="1134"/>
               </a:spcBef>
@@ -3717,24 +3661,21 @@
             <a:r>
               <a:rPr b="0" lang="en-US" sz="1800" spc="-1" strike="noStrike">
                 <a:solidFill>
-                  <a:schemeClr val="dk1"/>
-                </a:solidFill>
-                <a:latin typeface="Aptos"/>
+                  <a:srgbClr val="000000"/>
+                </a:solidFill>
+                <a:latin typeface="Arial"/>
               </a:rPr>
               <a:t>Second Outline Level</a:t>
             </a:r>
             <a:endParaRPr b="0" lang="en-US" sz="1800" spc="-1" strike="noStrike">
               <a:solidFill>
-                <a:schemeClr val="dk1"/>
-              </a:solidFill>
-              <a:latin typeface="Aptos"/>
+                <a:srgbClr val="000000"/>
+              </a:solidFill>
+              <a:latin typeface="Arial"/>
             </a:endParaRPr>
           </a:p>
           <a:p>
             <a:pPr lvl="2" marL="1296000" indent="-288000">
-              <a:lnSpc>
-                <a:spcPct val="90000"/>
-              </a:lnSpc>
               <a:spcBef>
                 <a:spcPts val="850"/>
               </a:spcBef>
@@ -3748,24 +3689,21 @@
             <a:r>
               <a:rPr b="0" lang="en-US" sz="1800" spc="-1" strike="noStrike">
                 <a:solidFill>
-                  <a:schemeClr val="dk1"/>
-                </a:solidFill>
-                <a:latin typeface="Aptos"/>
+                  <a:srgbClr val="000000"/>
+                </a:solidFill>
+                <a:latin typeface="Arial"/>
               </a:rPr>
               <a:t>Third Outline Level</a:t>
             </a:r>
             <a:endParaRPr b="0" lang="en-US" sz="1800" spc="-1" strike="noStrike">
               <a:solidFill>
-                <a:schemeClr val="dk1"/>
-              </a:solidFill>
-              <a:latin typeface="Aptos"/>
+                <a:srgbClr val="000000"/>
+              </a:solidFill>
+              <a:latin typeface="Arial"/>
             </a:endParaRPr>
           </a:p>
           <a:p>
             <a:pPr lvl="3" marL="1728000" indent="-216000">
-              <a:lnSpc>
-                <a:spcPct val="90000"/>
-              </a:lnSpc>
               <a:spcBef>
                 <a:spcPts val="567"/>
               </a:spcBef>
@@ -3779,24 +3717,21 @@
             <a:r>
               <a:rPr b="0" lang="en-US" sz="1800" spc="-1" strike="noStrike">
                 <a:solidFill>
-                  <a:schemeClr val="dk1"/>
-                </a:solidFill>
-                <a:latin typeface="Aptos"/>
+                  <a:srgbClr val="000000"/>
+                </a:solidFill>
+                <a:latin typeface="Arial"/>
               </a:rPr>
               <a:t>Fourth Outline Level</a:t>
             </a:r>
             <a:endParaRPr b="0" lang="en-US" sz="1800" spc="-1" strike="noStrike">
               <a:solidFill>
-                <a:schemeClr val="dk1"/>
-              </a:solidFill>
-              <a:latin typeface="Aptos"/>
+                <a:srgbClr val="000000"/>
+              </a:solidFill>
+              <a:latin typeface="Arial"/>
             </a:endParaRPr>
           </a:p>
           <a:p>
             <a:pPr lvl="4" marL="2160000" indent="-216000">
-              <a:lnSpc>
-                <a:spcPct val="90000"/>
-              </a:lnSpc>
               <a:spcBef>
                 <a:spcPts val="283"/>
               </a:spcBef>
@@ -3810,24 +3745,21 @@
             <a:r>
               <a:rPr b="0" lang="en-US" sz="1800" spc="-1" strike="noStrike">
                 <a:solidFill>
-                  <a:schemeClr val="dk1"/>
-                </a:solidFill>
-                <a:latin typeface="Aptos"/>
+                  <a:srgbClr val="000000"/>
+                </a:solidFill>
+                <a:latin typeface="Arial"/>
               </a:rPr>
               <a:t>Fifth Outline Level</a:t>
             </a:r>
             <a:endParaRPr b="0" lang="en-US" sz="1800" spc="-1" strike="noStrike">
               <a:solidFill>
-                <a:schemeClr val="dk1"/>
-              </a:solidFill>
-              <a:latin typeface="Aptos"/>
+                <a:srgbClr val="000000"/>
+              </a:solidFill>
+              <a:latin typeface="Arial"/>
             </a:endParaRPr>
           </a:p>
           <a:p>
             <a:pPr lvl="5" marL="2592000" indent="-216000">
-              <a:lnSpc>
-                <a:spcPct val="90000"/>
-              </a:lnSpc>
               <a:spcBef>
                 <a:spcPts val="283"/>
               </a:spcBef>
@@ -3841,24 +3773,21 @@
             <a:r>
               <a:rPr b="0" lang="en-US" sz="1800" spc="-1" strike="noStrike">
                 <a:solidFill>
-                  <a:schemeClr val="dk1"/>
-                </a:solidFill>
-                <a:latin typeface="Aptos"/>
+                  <a:srgbClr val="000000"/>
+                </a:solidFill>
+                <a:latin typeface="Arial"/>
               </a:rPr>
               <a:t>Sixth Outline Level</a:t>
             </a:r>
             <a:endParaRPr b="0" lang="en-US" sz="1800" spc="-1" strike="noStrike">
               <a:solidFill>
-                <a:schemeClr val="dk1"/>
-              </a:solidFill>
-              <a:latin typeface="Aptos"/>
+                <a:srgbClr val="000000"/>
+              </a:solidFill>
+              <a:latin typeface="Arial"/>
             </a:endParaRPr>
           </a:p>
           <a:p>
             <a:pPr lvl="6" marL="3024000" indent="-216000">
-              <a:lnSpc>
-                <a:spcPct val="90000"/>
-              </a:lnSpc>
               <a:spcBef>
                 <a:spcPts val="283"/>
               </a:spcBef>
@@ -3872,17 +3801,17 @@
             <a:r>
               <a:rPr b="0" lang="en-US" sz="1800" spc="-1" strike="noStrike">
                 <a:solidFill>
-                  <a:schemeClr val="dk1"/>
-                </a:solidFill>
-                <a:latin typeface="Aptos"/>
+                  <a:srgbClr val="000000"/>
+                </a:solidFill>
+                <a:latin typeface="Arial"/>
               </a:rPr>
               <a:t>Seventh Outline Level</a:t>
             </a:r>
             <a:endParaRPr b="0" lang="en-US" sz="1800" spc="-1" strike="noStrike">
               <a:solidFill>
-                <a:schemeClr val="dk1"/>
-              </a:solidFill>
-              <a:latin typeface="Aptos"/>
+                <a:srgbClr val="000000"/>
+              </a:solidFill>
+              <a:latin typeface="Arial"/>
             </a:endParaRPr>
           </a:p>
         </p:txBody>
@@ -3900,7 +3829,7 @@
         <p:spPr>
           <a:xfrm>
             <a:off x="6226200" y="1825560"/>
-            <a:ext cx="5130720" cy="4350600"/>
+            <a:ext cx="5130720" cy="4350240"/>
           </a:xfrm>
           <a:prstGeom prst="rect">
             <a:avLst/>
@@ -3916,9 +3845,6 @@
           </a:bodyPr>
           <a:p>
             <a:pPr marL="432000" indent="-324000">
-              <a:lnSpc>
-                <a:spcPct val="90000"/>
-              </a:lnSpc>
               <a:spcBef>
                 <a:spcPts val="1417"/>
               </a:spcBef>
@@ -3932,24 +3858,21 @@
             <a:r>
               <a:rPr b="0" lang="en-US" sz="1800" spc="-1" strike="noStrike">
                 <a:solidFill>
-                  <a:schemeClr val="dk1"/>
-                </a:solidFill>
-                <a:latin typeface="Aptos"/>
+                  <a:srgbClr val="000000"/>
+                </a:solidFill>
+                <a:latin typeface="Arial"/>
               </a:rPr>
               <a:t>Click to edit the outline text format</a:t>
             </a:r>
             <a:endParaRPr b="0" lang="en-US" sz="1800" spc="-1" strike="noStrike">
               <a:solidFill>
-                <a:schemeClr val="dk1"/>
-              </a:solidFill>
-              <a:latin typeface="Aptos"/>
+                <a:srgbClr val="000000"/>
+              </a:solidFill>
+              <a:latin typeface="Arial"/>
             </a:endParaRPr>
           </a:p>
           <a:p>
             <a:pPr lvl="1" marL="864000" indent="-324000">
-              <a:lnSpc>
-                <a:spcPct val="90000"/>
-              </a:lnSpc>
               <a:spcBef>
                 <a:spcPts val="1134"/>
               </a:spcBef>
@@ -3963,24 +3886,21 @@
             <a:r>
               <a:rPr b="0" lang="en-US" sz="1800" spc="-1" strike="noStrike">
                 <a:solidFill>
-                  <a:schemeClr val="dk1"/>
-                </a:solidFill>
-                <a:latin typeface="Aptos"/>
+                  <a:srgbClr val="000000"/>
+                </a:solidFill>
+                <a:latin typeface="Arial"/>
               </a:rPr>
               <a:t>Second Outline Level</a:t>
             </a:r>
             <a:endParaRPr b="0" lang="en-US" sz="1800" spc="-1" strike="noStrike">
               <a:solidFill>
-                <a:schemeClr val="dk1"/>
-              </a:solidFill>
-              <a:latin typeface="Aptos"/>
+                <a:srgbClr val="000000"/>
+              </a:solidFill>
+              <a:latin typeface="Arial"/>
             </a:endParaRPr>
           </a:p>
           <a:p>
             <a:pPr lvl="2" marL="1296000" indent="-288000">
-              <a:lnSpc>
-                <a:spcPct val="90000"/>
-              </a:lnSpc>
               <a:spcBef>
                 <a:spcPts val="850"/>
               </a:spcBef>
@@ -3994,24 +3914,21 @@
             <a:r>
               <a:rPr b="0" lang="en-US" sz="1800" spc="-1" strike="noStrike">
                 <a:solidFill>
-                  <a:schemeClr val="dk1"/>
-                </a:solidFill>
-                <a:latin typeface="Aptos"/>
+                  <a:srgbClr val="000000"/>
+                </a:solidFill>
+                <a:latin typeface="Arial"/>
               </a:rPr>
               <a:t>Third Outline Level</a:t>
             </a:r>
             <a:endParaRPr b="0" lang="en-US" sz="1800" spc="-1" strike="noStrike">
               <a:solidFill>
-                <a:schemeClr val="dk1"/>
-              </a:solidFill>
-              <a:latin typeface="Aptos"/>
+                <a:srgbClr val="000000"/>
+              </a:solidFill>
+              <a:latin typeface="Arial"/>
             </a:endParaRPr>
           </a:p>
           <a:p>
             <a:pPr lvl="3" marL="1728000" indent="-216000">
-              <a:lnSpc>
-                <a:spcPct val="90000"/>
-              </a:lnSpc>
               <a:spcBef>
                 <a:spcPts val="567"/>
               </a:spcBef>
@@ -4025,24 +3942,21 @@
             <a:r>
               <a:rPr b="0" lang="en-US" sz="1800" spc="-1" strike="noStrike">
                 <a:solidFill>
-                  <a:schemeClr val="dk1"/>
-                </a:solidFill>
-                <a:latin typeface="Aptos"/>
+                  <a:srgbClr val="000000"/>
+                </a:solidFill>
+                <a:latin typeface="Arial"/>
               </a:rPr>
               <a:t>Fourth Outline Level</a:t>
             </a:r>
             <a:endParaRPr b="0" lang="en-US" sz="1800" spc="-1" strike="noStrike">
               <a:solidFill>
-                <a:schemeClr val="dk1"/>
-              </a:solidFill>
-              <a:latin typeface="Aptos"/>
+                <a:srgbClr val="000000"/>
+              </a:solidFill>
+              <a:latin typeface="Arial"/>
             </a:endParaRPr>
           </a:p>
           <a:p>
             <a:pPr lvl="4" marL="2160000" indent="-216000">
-              <a:lnSpc>
-                <a:spcPct val="90000"/>
-              </a:lnSpc>
               <a:spcBef>
                 <a:spcPts val="283"/>
               </a:spcBef>
@@ -4056,24 +3970,21 @@
             <a:r>
               <a:rPr b="0" lang="en-US" sz="1800" spc="-1" strike="noStrike">
                 <a:solidFill>
-                  <a:schemeClr val="dk1"/>
-                </a:solidFill>
-                <a:latin typeface="Aptos"/>
+                  <a:srgbClr val="000000"/>
+                </a:solidFill>
+                <a:latin typeface="Arial"/>
               </a:rPr>
               <a:t>Fifth Outline Level</a:t>
             </a:r>
             <a:endParaRPr b="0" lang="en-US" sz="1800" spc="-1" strike="noStrike">
               <a:solidFill>
-                <a:schemeClr val="dk1"/>
-              </a:solidFill>
-              <a:latin typeface="Aptos"/>
+                <a:srgbClr val="000000"/>
+              </a:solidFill>
+              <a:latin typeface="Arial"/>
             </a:endParaRPr>
           </a:p>
           <a:p>
             <a:pPr lvl="5" marL="2592000" indent="-216000">
-              <a:lnSpc>
-                <a:spcPct val="90000"/>
-              </a:lnSpc>
               <a:spcBef>
                 <a:spcPts val="283"/>
               </a:spcBef>
@@ -4087,24 +3998,21 @@
             <a:r>
               <a:rPr b="0" lang="en-US" sz="1800" spc="-1" strike="noStrike">
                 <a:solidFill>
-                  <a:schemeClr val="dk1"/>
-                </a:solidFill>
-                <a:latin typeface="Aptos"/>
+                  <a:srgbClr val="000000"/>
+                </a:solidFill>
+                <a:latin typeface="Arial"/>
               </a:rPr>
               <a:t>Sixth Outline Level</a:t>
             </a:r>
             <a:endParaRPr b="0" lang="en-US" sz="1800" spc="-1" strike="noStrike">
               <a:solidFill>
-                <a:schemeClr val="dk1"/>
-              </a:solidFill>
-              <a:latin typeface="Aptos"/>
+                <a:srgbClr val="000000"/>
+              </a:solidFill>
+              <a:latin typeface="Arial"/>
             </a:endParaRPr>
           </a:p>
           <a:p>
             <a:pPr lvl="6" marL="3024000" indent="-216000">
-              <a:lnSpc>
-                <a:spcPct val="90000"/>
-              </a:lnSpc>
               <a:spcBef>
                 <a:spcPts val="283"/>
               </a:spcBef>
@@ -4118,17 +4026,17 @@
             <a:r>
               <a:rPr b="0" lang="en-US" sz="1800" spc="-1" strike="noStrike">
                 <a:solidFill>
-                  <a:schemeClr val="dk1"/>
-                </a:solidFill>
-                <a:latin typeface="Aptos"/>
+                  <a:srgbClr val="000000"/>
+                </a:solidFill>
+                <a:latin typeface="Arial"/>
               </a:rPr>
               <a:t>Seventh Outline Level</a:t>
             </a:r>
             <a:endParaRPr b="0" lang="en-US" sz="1800" spc="-1" strike="noStrike">
               <a:solidFill>
-                <a:schemeClr val="dk1"/>
-              </a:solidFill>
-              <a:latin typeface="Aptos"/>
+                <a:srgbClr val="000000"/>
+              </a:solidFill>
+              <a:latin typeface="Arial"/>
             </a:endParaRPr>
           </a:p>
         </p:txBody>
@@ -4146,7 +4054,7 @@
         <p:spPr>
           <a:xfrm>
             <a:off x="4038480" y="6356520"/>
-            <a:ext cx="4114080" cy="364320"/>
+            <a:ext cx="4113720" cy="363960"/>
           </a:xfrm>
           <a:prstGeom prst="rect">
             <a:avLst/>
@@ -4218,7 +4126,7 @@
         <p:spPr>
           <a:xfrm>
             <a:off x="8610480" y="6356520"/>
-            <a:ext cx="2742480" cy="364320"/>
+            <a:ext cx="2742120" cy="363960"/>
           </a:xfrm>
           <a:prstGeom prst="rect">
             <a:avLst/>
@@ -4261,7 +4169,7 @@
                 <a:tab algn="l" pos="0"/>
               </a:tabLst>
             </a:pPr>
-            <a:fld id="{FBD7EADA-74E9-4D23-8C49-BD0AAB24AF8F}" type="slidenum">
+            <a:fld id="{2110D3ED-3B57-46F7-814C-DFE7F4BD7A59}" type="slidenum">
               <a:rPr b="0" lang="en-US" sz="1200" spc="-1" strike="noStrike">
                 <a:solidFill>
                   <a:schemeClr val="dk1">
@@ -4294,7 +4202,7 @@
         <p:spPr>
           <a:xfrm>
             <a:off x="838080" y="6356520"/>
-            <a:ext cx="2742480" cy="364320"/>
+            <a:ext cx="2742120" cy="363960"/>
           </a:xfrm>
           <a:prstGeom prst="rect">
             <a:avLst/>
@@ -4387,7 +4295,7 @@
         <p:spPr>
           <a:xfrm>
             <a:off x="4038480" y="6356520"/>
-            <a:ext cx="4114080" cy="364320"/>
+            <a:ext cx="4113720" cy="363960"/>
           </a:xfrm>
           <a:prstGeom prst="rect">
             <a:avLst/>
@@ -4459,7 +4367,7 @@
         <p:spPr>
           <a:xfrm>
             <a:off x="8610480" y="6356520"/>
-            <a:ext cx="2742480" cy="364320"/>
+            <a:ext cx="2742120" cy="363960"/>
           </a:xfrm>
           <a:prstGeom prst="rect">
             <a:avLst/>
@@ -4502,7 +4410,7 @@
                 <a:tab algn="l" pos="0"/>
               </a:tabLst>
             </a:pPr>
-            <a:fld id="{BA49B3BD-79B9-4F56-AA4B-39A0041CF833}" type="slidenum">
+            <a:fld id="{B011E28E-522B-4C69-8F90-23F20F43D100}" type="slidenum">
               <a:rPr b="0" lang="en-US" sz="1200" spc="-1" strike="noStrike">
                 <a:solidFill>
                   <a:schemeClr val="dk1">
@@ -4535,7 +4443,7 @@
         <p:spPr>
           <a:xfrm>
             <a:off x="838080" y="6356520"/>
-            <a:ext cx="2742480" cy="364320"/>
+            <a:ext cx="2742120" cy="363960"/>
           </a:xfrm>
           <a:prstGeom prst="rect">
             <a:avLst/>
@@ -4628,7 +4536,7 @@
         <p:spPr>
           <a:xfrm>
             <a:off x="838080" y="365040"/>
-            <a:ext cx="10514880" cy="1324800"/>
+            <a:ext cx="10514520" cy="1324440"/>
           </a:xfrm>
           <a:prstGeom prst="rect">
             <a:avLst/>
@@ -4647,19 +4555,19 @@
               <a:buNone/>
             </a:pPr>
             <a:r>
-              <a:rPr b="0" lang="en-US" sz="4400" spc="-1" strike="noStrike">
-                <a:solidFill>
-                  <a:schemeClr val="dk1"/>
-                </a:solidFill>
-                <a:latin typeface="Aptos"/>
+              <a:rPr b="0" lang="en-US" sz="1800" spc="-1" strike="noStrike">
+                <a:solidFill>
+                  <a:srgbClr val="000000"/>
+                </a:solidFill>
+                <a:latin typeface="Arial"/>
               </a:rPr>
               <a:t>Click to edit the title text format</a:t>
             </a:r>
-            <a:endParaRPr b="0" lang="en-US" sz="4400" spc="-1" strike="noStrike">
-              <a:solidFill>
-                <a:schemeClr val="dk1"/>
-              </a:solidFill>
-              <a:latin typeface="Aptos"/>
+            <a:endParaRPr b="0" lang="en-US" sz="1800" spc="-1" strike="noStrike">
+              <a:solidFill>
+                <a:srgbClr val="000000"/>
+              </a:solidFill>
+              <a:latin typeface="Arial"/>
             </a:endParaRPr>
           </a:p>
         </p:txBody>
@@ -4677,7 +4585,7 @@
         <p:spPr>
           <a:xfrm>
             <a:off x="4038480" y="6356520"/>
-            <a:ext cx="4114080" cy="364320"/>
+            <a:ext cx="4113720" cy="363960"/>
           </a:xfrm>
           <a:prstGeom prst="rect">
             <a:avLst/>
@@ -4749,7 +4657,7 @@
         <p:spPr>
           <a:xfrm>
             <a:off x="8610480" y="6356520"/>
-            <a:ext cx="2742480" cy="364320"/>
+            <a:ext cx="2742120" cy="363960"/>
           </a:xfrm>
           <a:prstGeom prst="rect">
             <a:avLst/>
@@ -4792,7 +4700,7 @@
                 <a:tab algn="l" pos="0"/>
               </a:tabLst>
             </a:pPr>
-            <a:fld id="{A3DD8713-899A-4CD7-80EE-3E1DCA28F3D3}" type="slidenum">
+            <a:fld id="{73659CAA-F686-468C-A117-C0EBF4706D1A}" type="slidenum">
               <a:rPr b="0" lang="en-US" sz="1200" spc="-1" strike="noStrike">
                 <a:solidFill>
                   <a:schemeClr val="dk1">
@@ -4825,7 +4733,7 @@
         <p:spPr>
           <a:xfrm>
             <a:off x="838080" y="6356520"/>
-            <a:ext cx="2742480" cy="364320"/>
+            <a:ext cx="2742120" cy="363960"/>
           </a:xfrm>
           <a:prstGeom prst="rect">
             <a:avLst/>
@@ -4918,7 +4826,7 @@
         <p:spPr>
           <a:xfrm>
             <a:off x="4038480" y="6356520"/>
-            <a:ext cx="4114080" cy="364320"/>
+            <a:ext cx="4113720" cy="363960"/>
           </a:xfrm>
           <a:prstGeom prst="rect">
             <a:avLst/>
@@ -4990,7 +4898,7 @@
         <p:spPr>
           <a:xfrm>
             <a:off x="8610480" y="6356520"/>
-            <a:ext cx="2742480" cy="364320"/>
+            <a:ext cx="2742120" cy="363960"/>
           </a:xfrm>
           <a:prstGeom prst="rect">
             <a:avLst/>
@@ -5033,7 +4941,7 @@
                 <a:tab algn="l" pos="0"/>
               </a:tabLst>
             </a:pPr>
-            <a:fld id="{324B55CC-3B2C-42A2-B39B-C0E943C6E598}" type="slidenum">
+            <a:fld id="{447F3FE3-7408-40C4-96A1-B1CFEB92583C}" type="slidenum">
               <a:rPr b="0" lang="en-US" sz="1200" spc="-1" strike="noStrike">
                 <a:solidFill>
                   <a:schemeClr val="dk1">
@@ -5066,7 +4974,7 @@
         <p:spPr>
           <a:xfrm>
             <a:off x="838080" y="6356520"/>
-            <a:ext cx="2742480" cy="364320"/>
+            <a:ext cx="2742120" cy="363960"/>
           </a:xfrm>
           <a:prstGeom prst="rect">
             <a:avLst/>
@@ -5235,7 +5143,7 @@
         <p:spPr>
           <a:xfrm>
             <a:off x="209520" y="174600"/>
-            <a:ext cx="10514880" cy="1324800"/>
+            <a:ext cx="10514520" cy="1324440"/>
           </a:xfrm>
           <a:prstGeom prst="rect">
             <a:avLst/>
@@ -5247,7 +5155,7 @@
         </p:spPr>
         <p:txBody>
           <a:bodyPr lIns="91440" rIns="91440" tIns="45720" bIns="45720" anchor="ctr">
-            <a:normAutofit fontScale="90240"/>
+            <a:normAutofit fontScale="89999"/>
           </a:bodyPr>
           <a:p>
             <a:pPr indent="0" defTabSz="914400">
@@ -5315,9 +5223,9 @@
             </a:br>
             <a:endParaRPr b="0" lang="en-US" sz="1800" spc="-1" strike="noStrike">
               <a:solidFill>
-                <a:schemeClr val="dk1"/>
-              </a:solidFill>
-              <a:latin typeface="Aptos"/>
+                <a:srgbClr val="000000"/>
+              </a:solidFill>
+              <a:latin typeface="Arial"/>
             </a:endParaRPr>
           </a:p>
         </p:txBody>
@@ -5335,7 +5243,7 @@
         <p:spPr>
           <a:xfrm>
             <a:off x="0" y="1073160"/>
-            <a:ext cx="12191400" cy="6063480"/>
+            <a:ext cx="12191040" cy="6063120"/>
           </a:xfrm>
           <a:prstGeom prst="rect">
             <a:avLst/>
@@ -5388,7 +5296,7 @@
         <p:spPr>
           <a:xfrm>
             <a:off x="838080" y="365040"/>
-            <a:ext cx="10514880" cy="1324800"/>
+            <a:ext cx="10514520" cy="1324440"/>
           </a:xfrm>
           <a:prstGeom prst="rect">
             <a:avLst/>
@@ -5400,7 +5308,7 @@
         </p:spPr>
         <p:txBody>
           <a:bodyPr lIns="91440" rIns="91440" tIns="45720" bIns="45720" anchor="ctr">
-            <a:normAutofit fontScale="90240"/>
+            <a:normAutofit fontScale="89999"/>
           </a:bodyPr>
           <a:p>
             <a:pPr indent="0" defTabSz="914400">
@@ -5450,9 +5358,9 @@
             </a:br>
             <a:endParaRPr b="0" lang="en-US" sz="1800" spc="-1" strike="noStrike">
               <a:solidFill>
-                <a:schemeClr val="dk1"/>
-              </a:solidFill>
-              <a:latin typeface="Aptos"/>
+                <a:srgbClr val="000000"/>
+              </a:solidFill>
+              <a:latin typeface="Arial"/>
             </a:endParaRPr>
           </a:p>
         </p:txBody>
@@ -5470,7 +5378,7 @@
         <p:spPr>
           <a:xfrm>
             <a:off x="3971880" y="2467080"/>
-            <a:ext cx="4247280" cy="3180600"/>
+            <a:ext cx="4246920" cy="3180240"/>
           </a:xfrm>
           <a:prstGeom prst="rect">
             <a:avLst/>
@@ -5523,7 +5431,7 @@
         <p:spPr>
           <a:xfrm>
             <a:off x="838080" y="365040"/>
-            <a:ext cx="10514880" cy="1324800"/>
+            <a:ext cx="10514520" cy="1324440"/>
           </a:xfrm>
           <a:prstGeom prst="rect">
             <a:avLst/>
@@ -5535,7 +5443,7 @@
         </p:spPr>
         <p:txBody>
           <a:bodyPr lIns="91440" rIns="91440" tIns="45720" bIns="45720" anchor="ctr">
-            <a:normAutofit fontScale="90240"/>
+            <a:normAutofit fontScale="89999"/>
           </a:bodyPr>
           <a:p>
             <a:pPr indent="0" defTabSz="914400">
@@ -5585,9 +5493,9 @@
             </a:br>
             <a:endParaRPr b="0" lang="en-US" sz="1800" spc="-1" strike="noStrike">
               <a:solidFill>
-                <a:schemeClr val="dk1"/>
-              </a:solidFill>
-              <a:latin typeface="Aptos"/>
+                <a:srgbClr val="000000"/>
+              </a:solidFill>
+              <a:latin typeface="Arial"/>
             </a:endParaRPr>
           </a:p>
         </p:txBody>
@@ -5605,7 +5513,7 @@
         <p:spPr>
           <a:xfrm>
             <a:off x="3629160" y="2514600"/>
-            <a:ext cx="4247280" cy="3180600"/>
+            <a:ext cx="4246920" cy="3180240"/>
           </a:xfrm>
           <a:prstGeom prst="rect">
             <a:avLst/>
@@ -5658,7 +5566,7 @@
         <p:spPr>
           <a:xfrm>
             <a:off x="2057400" y="685800"/>
-            <a:ext cx="8000640" cy="6316200"/>
+            <a:ext cx="8000280" cy="6315840"/>
           </a:xfrm>
           <a:prstGeom prst="rect">
             <a:avLst/>
@@ -5677,7 +5585,7 @@
         <p:spPr>
           <a:xfrm>
             <a:off x="511200" y="228600"/>
-            <a:ext cx="6575040" cy="385920"/>
+            <a:ext cx="6574680" cy="385560"/>
           </a:xfrm>
           <a:prstGeom prst="rect">
             <a:avLst/>
@@ -5760,8 +5668,8 @@
         </p:nvSpPr>
         <p:spPr>
           <a:xfrm rot="21535200">
-            <a:off x="5404320" y="3052080"/>
-            <a:ext cx="384840" cy="336240"/>
+            <a:off x="5403960" y="3051720"/>
+            <a:ext cx="384480" cy="335880"/>
           </a:xfrm>
           <a:prstGeom prst="rect">
             <a:avLst/>
@@ -6003,7 +5911,7 @@
         <p:spPr>
           <a:xfrm>
             <a:off x="7027920" y="360"/>
-            <a:ext cx="4630320" cy="6857280"/>
+            <a:ext cx="4629960" cy="6856920"/>
           </a:xfrm>
           <a:prstGeom prst="rect">
             <a:avLst/>
@@ -6026,7 +5934,7 @@
         <p:spPr>
           <a:xfrm>
             <a:off x="238320" y="53640"/>
-            <a:ext cx="5247720" cy="3068640"/>
+            <a:ext cx="5247360" cy="3068280"/>
           </a:xfrm>
           <a:prstGeom prst="rect">
             <a:avLst/>
@@ -6049,7 +5957,7 @@
         <p:spPr>
           <a:xfrm>
             <a:off x="85320" y="3019680"/>
-            <a:ext cx="5400720" cy="2694960"/>
+            <a:ext cx="5400360" cy="2694600"/>
           </a:xfrm>
           <a:prstGeom prst="rect">
             <a:avLst/>
@@ -6072,7 +5980,7 @@
         <p:spPr>
           <a:xfrm>
             <a:off x="152640" y="5715000"/>
-            <a:ext cx="6247800" cy="1384920"/>
+            <a:ext cx="6247440" cy="1384560"/>
           </a:xfrm>
           <a:prstGeom prst="rect">
             <a:avLst/>
@@ -6125,7 +6033,7 @@
         <p:spPr>
           <a:xfrm>
             <a:off x="342720" y="134280"/>
-            <a:ext cx="10514880" cy="1324800"/>
+            <a:ext cx="10514520" cy="1324440"/>
           </a:xfrm>
           <a:prstGeom prst="rect">
             <a:avLst/>
@@ -6145,6 +6053,9 @@
                 <a:spcPct val="90000"/>
               </a:lnSpc>
               <a:buNone/>
+              <a:tabLst>
+                <a:tab algn="l" pos="0"/>
+              </a:tabLst>
             </a:pPr>
             <a:r>
               <a:rPr b="0" lang="en-US" sz="1200" spc="-1" strike="noStrike">
@@ -6241,9 +6152,9 @@
             </a:br>
             <a:endParaRPr b="0" lang="en-US" sz="1200" spc="-1" strike="noStrike">
               <a:solidFill>
-                <a:schemeClr val="dk1"/>
-              </a:solidFill>
-              <a:latin typeface="Aptos"/>
+                <a:srgbClr val="000000"/>
+              </a:solidFill>
+              <a:latin typeface="Arial"/>
             </a:endParaRPr>
           </a:p>
         </p:txBody>
@@ -6261,7 +6172,7 @@
         <p:spPr>
           <a:xfrm>
             <a:off x="-95400" y="1158840"/>
-            <a:ext cx="12191760" cy="6063840"/>
+            <a:ext cx="12191400" cy="6063480"/>
           </a:xfrm>
           <a:prstGeom prst="rect">
             <a:avLst/>
@@ -6314,7 +6225,7 @@
         <p:spPr>
           <a:xfrm>
             <a:off x="85680" y="-92160"/>
-            <a:ext cx="10514880" cy="1324800"/>
+            <a:ext cx="10514520" cy="1324440"/>
           </a:xfrm>
           <a:prstGeom prst="rect">
             <a:avLst/>
@@ -6334,6 +6245,9 @@
                 <a:spcPct val="90000"/>
               </a:lnSpc>
               <a:buNone/>
+              <a:tabLst>
+                <a:tab algn="l" pos="0"/>
+              </a:tabLst>
             </a:pPr>
             <a:r>
               <a:rPr b="0" lang="en-US" sz="1200" spc="-1" strike="noStrike">
@@ -6424,9 +6338,9 @@
             </a:r>
             <a:endParaRPr b="0" lang="en-US" sz="1200" spc="-1" strike="noStrike">
               <a:solidFill>
-                <a:schemeClr val="dk1"/>
-              </a:solidFill>
-              <a:latin typeface="Aptos"/>
+                <a:srgbClr val="000000"/>
+              </a:solidFill>
+              <a:latin typeface="Arial"/>
             </a:endParaRPr>
           </a:p>
         </p:txBody>
@@ -6444,7 +6358,7 @@
         <p:spPr>
           <a:xfrm>
             <a:off x="0" y="1233000"/>
-            <a:ext cx="12191760" cy="6063840"/>
+            <a:ext cx="12191400" cy="6063480"/>
           </a:xfrm>
           <a:prstGeom prst="rect">
             <a:avLst/>
@@ -6497,7 +6411,7 @@
         <p:spPr>
           <a:xfrm>
             <a:off x="495720" y="1371600"/>
-            <a:ext cx="5447880" cy="4304880"/>
+            <a:ext cx="5447520" cy="4304520"/>
           </a:xfrm>
           <a:prstGeom prst="rect">
             <a:avLst/>
@@ -6520,7 +6434,7 @@
         <p:spPr>
           <a:xfrm>
             <a:off x="7086600" y="1867320"/>
-            <a:ext cx="5447880" cy="4304880"/>
+            <a:ext cx="5447520" cy="4304520"/>
           </a:xfrm>
           <a:prstGeom prst="rect">
             <a:avLst/>
@@ -6573,7 +6487,7 @@
         <p:spPr>
           <a:xfrm>
             <a:off x="3924720" y="1828800"/>
-            <a:ext cx="5447880" cy="4304880"/>
+            <a:ext cx="5447520" cy="4304520"/>
           </a:xfrm>
           <a:prstGeom prst="rect">
             <a:avLst/>
@@ -6613,9 +6527,185 @@
           <a:chExt cx="0" cy="0"/>
         </a:xfrm>
       </p:grpSpPr>
+      <p:sp>
+        <p:nvSpPr>
+          <p:cNvPr id="90" name=""/>
+          <p:cNvSpPr txBox="1"/>
+          <p:nvPr/>
+        </p:nvSpPr>
+        <p:spPr>
+          <a:xfrm>
+            <a:off x="2514600" y="330120"/>
+            <a:ext cx="5821200" cy="355680"/>
+          </a:xfrm>
+          <a:prstGeom prst="rect">
+            <a:avLst/>
+          </a:prstGeom>
+          <a:noFill/>
+          <a:ln w="0">
+            <a:noFill/>
+          </a:ln>
+        </p:spPr>
+        <p:txBody>
+          <a:bodyPr lIns="90000" rIns="90000" tIns="45000" bIns="45000" anchor="t">
+            <a:noAutofit/>
+          </a:bodyPr>
+          <a:p>
+            <a:r>
+              <a:rPr b="0" lang="en-US" sz="1800" spc="-1" strike="noStrike">
+                <a:solidFill>
+                  <a:srgbClr val="000000"/>
+                </a:solidFill>
+                <a:latin typeface="Consolas;Courier"/>
+                <a:ea typeface="Consolas;Courier"/>
+              </a:rPr>
+              <a:t>constraints = [constraints, con7_2];</a:t>
+            </a:r>
+            <a:endParaRPr b="0" lang="en-US" sz="1800" spc="-1" strike="noStrike">
+              <a:solidFill>
+                <a:srgbClr val="000000"/>
+              </a:solidFill>
+              <a:latin typeface="Consolas;Courier"/>
+              <a:ea typeface="Consolas;Courier"/>
+            </a:endParaRPr>
+          </a:p>
+        </p:txBody>
+      </p:sp>
+      <p:sp>
+        <p:nvSpPr>
+          <p:cNvPr id="91" name=""/>
+          <p:cNvSpPr txBox="1"/>
+          <p:nvPr/>
+        </p:nvSpPr>
+        <p:spPr>
+          <a:xfrm>
+            <a:off x="4343400" y="630720"/>
+            <a:ext cx="6235560" cy="355680"/>
+          </a:xfrm>
+          <a:prstGeom prst="rect">
+            <a:avLst/>
+          </a:prstGeom>
+          <a:noFill/>
+          <a:ln w="0">
+            <a:noFill/>
+          </a:ln>
+        </p:spPr>
+        <p:txBody>
+          <a:bodyPr wrap="none" lIns="90000" rIns="90000" tIns="45000" bIns="45000" anchor="t">
+            <a:noAutofit/>
+          </a:bodyPr>
+          <a:p>
+            <a:r>
+              <a:rPr b="0" lang="en-US" sz="1800" spc="-1" strike="noStrike">
+                <a:solidFill>
+                  <a:srgbClr val="000000"/>
+                </a:solidFill>
+                <a:latin typeface="Consolas;Courier"/>
+                <a:ea typeface="Consolas;Courier"/>
+              </a:rPr>
+              <a:t>constraints = [constraints, con7_2, con7_3];</a:t>
+            </a:r>
+            <a:endParaRPr b="0" lang="en-US" sz="1800" spc="-1" strike="noStrike">
+              <a:solidFill>
+                <a:srgbClr val="000000"/>
+              </a:solidFill>
+              <a:latin typeface="Consolas;Courier"/>
+              <a:ea typeface="Consolas;Courier"/>
+            </a:endParaRPr>
+          </a:p>
+        </p:txBody>
+      </p:sp>
+      <p:sp>
+        <p:nvSpPr>
+          <p:cNvPr id="92" name=""/>
+          <p:cNvSpPr txBox="1"/>
+          <p:nvPr/>
+        </p:nvSpPr>
+        <p:spPr>
+          <a:xfrm>
+            <a:off x="5282640" y="914400"/>
+            <a:ext cx="7061760" cy="355680"/>
+          </a:xfrm>
+          <a:prstGeom prst="rect">
+            <a:avLst/>
+          </a:prstGeom>
+          <a:noFill/>
+          <a:ln w="0">
+            <a:noFill/>
+          </a:ln>
+        </p:spPr>
+        <p:txBody>
+          <a:bodyPr wrap="none" lIns="90000" rIns="90000" tIns="45000" bIns="45000" anchor="t">
+            <a:noAutofit/>
+          </a:bodyPr>
+          <a:p>
+            <a:r>
+              <a:rPr b="0" lang="en-US" sz="1800" spc="-1" strike="noStrike">
+                <a:solidFill>
+                  <a:srgbClr val="000000"/>
+                </a:solidFill>
+                <a:latin typeface="Consolas;Courier"/>
+                <a:ea typeface="Consolas;Courier"/>
+              </a:rPr>
+              <a:t>constraints = [constraints, con7_2, con7_3, con8];</a:t>
+            </a:r>
+            <a:endParaRPr b="0" lang="en-US" sz="1800" spc="-1" strike="noStrike">
+              <a:solidFill>
+                <a:srgbClr val="000000"/>
+              </a:solidFill>
+              <a:latin typeface="Consolas;Courier"/>
+              <a:ea typeface="Consolas;Courier"/>
+            </a:endParaRPr>
+          </a:p>
+        </p:txBody>
+      </p:sp>
+      <p:sp>
+        <p:nvSpPr>
+          <p:cNvPr id="93" name=""/>
+          <p:cNvSpPr txBox="1"/>
+          <p:nvPr/>
+        </p:nvSpPr>
+        <p:spPr>
+          <a:xfrm>
+            <a:off x="81360" y="0"/>
+            <a:ext cx="4033440" cy="355680"/>
+          </a:xfrm>
+          <a:prstGeom prst="rect">
+            <a:avLst/>
+          </a:prstGeom>
+          <a:noFill/>
+          <a:ln w="0">
+            <a:noFill/>
+          </a:ln>
+        </p:spPr>
+        <p:txBody>
+          <a:bodyPr wrap="none" lIns="90000" rIns="90000" tIns="45000" bIns="45000" anchor="t">
+            <a:noAutofit/>
+          </a:bodyPr>
+          <a:p>
+            <a:r>
+              <a:rPr b="0" lang="en-US" sz="1800" spc="-1" strike="noStrike">
+                <a:solidFill>
+                  <a:srgbClr val="000000"/>
+                </a:solidFill>
+                <a:latin typeface="Consolas;Courier"/>
+                <a:ea typeface="Consolas;Courier"/>
+              </a:rPr>
+              <a:t>constraints = [constraints];</a:t>
+            </a:r>
+            <a:endParaRPr b="0" lang="en-US" sz="1800" spc="-1" strike="noStrike">
+              <a:solidFill>
+                <a:srgbClr val="000000"/>
+              </a:solidFill>
+              <a:latin typeface="Consolas;Courier"/>
+              <a:ea typeface="Consolas;Courier"/>
+            </a:endParaRPr>
+          </a:p>
+        </p:txBody>
+      </p:sp>
       <p:pic>
         <p:nvPicPr>
-          <p:cNvPr id="90" name="" descr=""/>
+          <p:cNvPr id="94" name="" descr=""/>
           <p:cNvPicPr/>
           <p:nvPr/>
         </p:nvPicPr>
@@ -6625,8 +6715,169 @@
         </p:blipFill>
         <p:spPr>
           <a:xfrm>
-            <a:off x="2971800" y="1028880"/>
-            <a:ext cx="5333760" cy="4000320"/>
+            <a:off x="6172200" y="1600200"/>
+            <a:ext cx="2748600" cy="2286000"/>
+          </a:xfrm>
+          <a:prstGeom prst="rect">
+            <a:avLst/>
+          </a:prstGeom>
+          <a:ln w="0">
+            <a:noFill/>
+          </a:ln>
+        </p:spPr>
+      </p:pic>
+      <p:pic>
+        <p:nvPicPr>
+          <p:cNvPr id="95" name="" descr=""/>
+          <p:cNvPicPr/>
+          <p:nvPr/>
+        </p:nvPicPr>
+        <p:blipFill>
+          <a:blip r:embed="rId2"/>
+          <a:stretch/>
+        </p:blipFill>
+        <p:spPr>
+          <a:xfrm>
+            <a:off x="3195360" y="1600200"/>
+            <a:ext cx="2748240" cy="2286000"/>
+          </a:xfrm>
+          <a:prstGeom prst="rect">
+            <a:avLst/>
+          </a:prstGeom>
+          <a:ln w="0">
+            <a:noFill/>
+          </a:ln>
+        </p:spPr>
+      </p:pic>
+      <p:pic>
+        <p:nvPicPr>
+          <p:cNvPr id="96" name="" descr=""/>
+          <p:cNvPicPr/>
+          <p:nvPr/>
+        </p:nvPicPr>
+        <p:blipFill>
+          <a:blip r:embed="rId3"/>
+          <a:stretch/>
+        </p:blipFill>
+        <p:spPr>
+          <a:xfrm>
+            <a:off x="9144000" y="1511280"/>
+            <a:ext cx="2855160" cy="2374920"/>
+          </a:xfrm>
+          <a:prstGeom prst="rect">
+            <a:avLst/>
+          </a:prstGeom>
+          <a:ln w="0">
+            <a:noFill/>
+          </a:ln>
+        </p:spPr>
+      </p:pic>
+      <p:pic>
+        <p:nvPicPr>
+          <p:cNvPr id="97" name="" descr=""/>
+          <p:cNvPicPr/>
+          <p:nvPr/>
+        </p:nvPicPr>
+        <p:blipFill>
+          <a:blip r:embed="rId4"/>
+          <a:stretch/>
+        </p:blipFill>
+        <p:spPr>
+          <a:xfrm>
+            <a:off x="457200" y="1600200"/>
+            <a:ext cx="2626560" cy="2184840"/>
+          </a:xfrm>
+          <a:prstGeom prst="rect">
+            <a:avLst/>
+          </a:prstGeom>
+          <a:ln w="0">
+            <a:noFill/>
+          </a:ln>
+        </p:spPr>
+      </p:pic>
+      <p:pic>
+        <p:nvPicPr>
+          <p:cNvPr id="98" name="" descr=""/>
+          <p:cNvPicPr/>
+          <p:nvPr/>
+        </p:nvPicPr>
+        <p:blipFill>
+          <a:blip r:embed="rId5"/>
+          <a:stretch/>
+        </p:blipFill>
+        <p:spPr>
+          <a:xfrm>
+            <a:off x="228600" y="4191480"/>
+            <a:ext cx="2930760" cy="2437920"/>
+          </a:xfrm>
+          <a:prstGeom prst="rect">
+            <a:avLst/>
+          </a:prstGeom>
+          <a:ln w="0">
+            <a:noFill/>
+          </a:ln>
+        </p:spPr>
+      </p:pic>
+      <p:pic>
+        <p:nvPicPr>
+          <p:cNvPr id="99" name="" descr=""/>
+          <p:cNvPicPr/>
+          <p:nvPr/>
+        </p:nvPicPr>
+        <p:blipFill>
+          <a:blip r:embed="rId6"/>
+          <a:stretch/>
+        </p:blipFill>
+        <p:spPr>
+          <a:xfrm rot="15000">
+            <a:off x="9258840" y="4120920"/>
+            <a:ext cx="2851560" cy="2372040"/>
+          </a:xfrm>
+          <a:prstGeom prst="rect">
+            <a:avLst/>
+          </a:prstGeom>
+          <a:ln w="0">
+            <a:noFill/>
+          </a:ln>
+        </p:spPr>
+      </p:pic>
+      <p:pic>
+        <p:nvPicPr>
+          <p:cNvPr id="100" name="" descr=""/>
+          <p:cNvPicPr/>
+          <p:nvPr/>
+        </p:nvPicPr>
+        <p:blipFill>
+          <a:blip r:embed="rId7"/>
+          <a:stretch/>
+        </p:blipFill>
+        <p:spPr>
+          <a:xfrm>
+            <a:off x="6167160" y="4114800"/>
+            <a:ext cx="2748240" cy="2286000"/>
+          </a:xfrm>
+          <a:prstGeom prst="rect">
+            <a:avLst/>
+          </a:prstGeom>
+          <a:ln w="0">
+            <a:noFill/>
+          </a:ln>
+        </p:spPr>
+      </p:pic>
+      <p:pic>
+        <p:nvPicPr>
+          <p:cNvPr id="101" name="" descr=""/>
+          <p:cNvPicPr/>
+          <p:nvPr/>
+        </p:nvPicPr>
+        <p:blipFill>
+          <a:blip r:embed="rId8"/>
+          <a:stretch/>
+        </p:blipFill>
+        <p:spPr>
+          <a:xfrm>
+            <a:off x="3200400" y="4254480"/>
+            <a:ext cx="2580120" cy="2146320"/>
           </a:xfrm>
           <a:prstGeom prst="rect">
             <a:avLst/>
@@ -6679,7 +6930,7 @@
         <p:spPr>
           <a:xfrm>
             <a:off x="838080" y="365040"/>
-            <a:ext cx="10514880" cy="1324800"/>
+            <a:ext cx="10514520" cy="1324440"/>
           </a:xfrm>
           <a:prstGeom prst="rect">
             <a:avLst/>
@@ -6759,9 +7010,9 @@
             </a:br>
             <a:endParaRPr b="0" lang="en-US" sz="1800" spc="-1" strike="noStrike">
               <a:solidFill>
-                <a:schemeClr val="dk1"/>
-              </a:solidFill>
-              <a:latin typeface="Aptos"/>
+                <a:srgbClr val="000000"/>
+              </a:solidFill>
+              <a:latin typeface="Arial"/>
             </a:endParaRPr>
           </a:p>
         </p:txBody>
@@ -6779,7 +7030,7 @@
         <p:spPr>
           <a:xfrm>
             <a:off x="-305640" y="1027800"/>
-            <a:ext cx="12191400" cy="6063480"/>
+            <a:ext cx="12191040" cy="6063120"/>
           </a:xfrm>
           <a:prstGeom prst="rect">
             <a:avLst/>
@@ -6789,6 +7040,350 @@
           </a:ln>
         </p:spPr>
       </p:pic>
+    </p:spTree>
+  </p:cSld>
+  <mc:AlternateContent>
+    <mc:Choice Requires="p14">
+      <p:transition spd="slow" p14:dur="2000"/>
+    </mc:Choice>
+    <mc:Fallback>
+      <p:transition spd="slow"/>
+    </mc:Fallback>
+  </mc:AlternateContent>
+</p:sld>
+</file>
+
+<file path=ppt/slides/slide20.xml><?xml version="1.0" encoding="utf-8"?>
+<p:sld xmlns:a="http://schemas.openxmlformats.org/drawingml/2006/main" xmlns:p="http://schemas.openxmlformats.org/presentationml/2006/main" xmlns:r="http://schemas.openxmlformats.org/officeDocument/2006/relationships" xmlns:p14="http://schemas.microsoft.com/office/powerpoint/2010/main" xmlns:p15="http://schemas.microsoft.com/office/powerpoint/2012/main" xmlns:mc="http://schemas.openxmlformats.org/markup-compatibility/2006">
+  <p:cSld>
+    <p:spTree>
+      <p:nvGrpSpPr>
+        <p:cNvPr id="1" name=""/>
+        <p:cNvGrpSpPr/>
+        <p:nvPr/>
+      </p:nvGrpSpPr>
+      <p:grpSpPr>
+        <a:xfrm>
+          <a:off x="0" y="0"/>
+          <a:ext cx="0" cy="0"/>
+          <a:chOff x="0" y="0"/>
+          <a:chExt cx="0" cy="0"/>
+        </a:xfrm>
+      </p:grpSpPr>
+      <p:sp>
+        <p:nvSpPr>
+          <p:cNvPr id="102" name=""/>
+          <p:cNvSpPr txBox="1"/>
+          <p:nvPr/>
+        </p:nvSpPr>
+        <p:spPr>
+          <a:xfrm>
+            <a:off x="2514600" y="330120"/>
+            <a:ext cx="5821200" cy="355680"/>
+          </a:xfrm>
+          <a:prstGeom prst="rect">
+            <a:avLst/>
+          </a:prstGeom>
+          <a:noFill/>
+          <a:ln w="0">
+            <a:noFill/>
+          </a:ln>
+        </p:spPr>
+        <p:txBody>
+          <a:bodyPr lIns="90000" rIns="90000" tIns="45000" bIns="45000" anchor="t">
+            <a:noAutofit/>
+          </a:bodyPr>
+          <a:p>
+            <a:r>
+              <a:rPr b="0" lang="en-US" sz="1800" spc="-1" strike="noStrike">
+                <a:solidFill>
+                  <a:srgbClr val="000000"/>
+                </a:solidFill>
+                <a:latin typeface="Consolas;Courier"/>
+                <a:ea typeface="Consolas;Courier"/>
+              </a:rPr>
+              <a:t>constraints = [constraints, con7_2];</a:t>
+            </a:r>
+            <a:endParaRPr b="0" lang="en-US" sz="1800" spc="-1" strike="noStrike">
+              <a:solidFill>
+                <a:srgbClr val="000000"/>
+              </a:solidFill>
+              <a:latin typeface="Consolas;Courier"/>
+              <a:ea typeface="Consolas;Courier"/>
+            </a:endParaRPr>
+          </a:p>
+        </p:txBody>
+      </p:sp>
+      <p:sp>
+        <p:nvSpPr>
+          <p:cNvPr id="103" name=""/>
+          <p:cNvSpPr txBox="1"/>
+          <p:nvPr/>
+        </p:nvSpPr>
+        <p:spPr>
+          <a:xfrm>
+            <a:off x="4343400" y="630720"/>
+            <a:ext cx="6235560" cy="355680"/>
+          </a:xfrm>
+          <a:prstGeom prst="rect">
+            <a:avLst/>
+          </a:prstGeom>
+          <a:noFill/>
+          <a:ln w="0">
+            <a:noFill/>
+          </a:ln>
+        </p:spPr>
+        <p:txBody>
+          <a:bodyPr wrap="none" lIns="90000" rIns="90000" tIns="45000" bIns="45000" anchor="t">
+            <a:noAutofit/>
+          </a:bodyPr>
+          <a:p>
+            <a:r>
+              <a:rPr b="0" lang="en-US" sz="1800" spc="-1" strike="noStrike">
+                <a:solidFill>
+                  <a:srgbClr val="000000"/>
+                </a:solidFill>
+                <a:latin typeface="Consolas;Courier"/>
+                <a:ea typeface="Consolas;Courier"/>
+              </a:rPr>
+              <a:t>constraints = [constraints, con7_2, con7_3];</a:t>
+            </a:r>
+            <a:endParaRPr b="0" lang="en-US" sz="1800" spc="-1" strike="noStrike">
+              <a:solidFill>
+                <a:srgbClr val="000000"/>
+              </a:solidFill>
+              <a:latin typeface="Consolas;Courier"/>
+              <a:ea typeface="Consolas;Courier"/>
+            </a:endParaRPr>
+          </a:p>
+        </p:txBody>
+      </p:sp>
+      <p:sp>
+        <p:nvSpPr>
+          <p:cNvPr id="104" name=""/>
+          <p:cNvSpPr txBox="1"/>
+          <p:nvPr/>
+        </p:nvSpPr>
+        <p:spPr>
+          <a:xfrm>
+            <a:off x="5282640" y="914400"/>
+            <a:ext cx="7061760" cy="355680"/>
+          </a:xfrm>
+          <a:prstGeom prst="rect">
+            <a:avLst/>
+          </a:prstGeom>
+          <a:noFill/>
+          <a:ln w="0">
+            <a:noFill/>
+          </a:ln>
+        </p:spPr>
+        <p:txBody>
+          <a:bodyPr wrap="none" lIns="90000" rIns="90000" tIns="45000" bIns="45000" anchor="t">
+            <a:noAutofit/>
+          </a:bodyPr>
+          <a:p>
+            <a:r>
+              <a:rPr b="0" lang="en-US" sz="1800" spc="-1" strike="noStrike">
+                <a:solidFill>
+                  <a:srgbClr val="000000"/>
+                </a:solidFill>
+                <a:latin typeface="Consolas;Courier"/>
+                <a:ea typeface="Consolas;Courier"/>
+              </a:rPr>
+              <a:t>constraints = [constraints, con7_2, con7_3, con8];</a:t>
+            </a:r>
+            <a:endParaRPr b="0" lang="en-US" sz="1800" spc="-1" strike="noStrike">
+              <a:solidFill>
+                <a:srgbClr val="000000"/>
+              </a:solidFill>
+              <a:latin typeface="Consolas;Courier"/>
+              <a:ea typeface="Consolas;Courier"/>
+            </a:endParaRPr>
+          </a:p>
+        </p:txBody>
+      </p:sp>
+      <p:pic>
+        <p:nvPicPr>
+          <p:cNvPr id="105" name="" descr=""/>
+          <p:cNvPicPr/>
+          <p:nvPr/>
+        </p:nvPicPr>
+        <p:blipFill>
+          <a:blip r:embed="rId1"/>
+          <a:stretch/>
+        </p:blipFill>
+        <p:spPr>
+          <a:xfrm>
+            <a:off x="2423880" y="4114800"/>
+            <a:ext cx="3291120" cy="2885040"/>
+          </a:xfrm>
+          <a:prstGeom prst="rect">
+            <a:avLst/>
+          </a:prstGeom>
+          <a:ln w="0">
+            <a:noFill/>
+          </a:ln>
+        </p:spPr>
+      </p:pic>
+      <p:pic>
+        <p:nvPicPr>
+          <p:cNvPr id="106" name="" descr=""/>
+          <p:cNvPicPr/>
+          <p:nvPr/>
+        </p:nvPicPr>
+        <p:blipFill>
+          <a:blip r:embed="rId2"/>
+          <a:stretch/>
+        </p:blipFill>
+        <p:spPr>
+          <a:xfrm>
+            <a:off x="5526360" y="4213800"/>
+            <a:ext cx="3389040" cy="2812680"/>
+          </a:xfrm>
+          <a:prstGeom prst="rect">
+            <a:avLst/>
+          </a:prstGeom>
+          <a:ln w="0">
+            <a:noFill/>
+          </a:ln>
+        </p:spPr>
+      </p:pic>
+      <p:pic>
+        <p:nvPicPr>
+          <p:cNvPr id="107" name="" descr=""/>
+          <p:cNvPicPr/>
+          <p:nvPr/>
+        </p:nvPicPr>
+        <p:blipFill>
+          <a:blip r:embed="rId3"/>
+          <a:stretch/>
+        </p:blipFill>
+        <p:spPr>
+          <a:xfrm>
+            <a:off x="9144000" y="1270080"/>
+            <a:ext cx="3048120" cy="2648880"/>
+          </a:xfrm>
+          <a:prstGeom prst="rect">
+            <a:avLst/>
+          </a:prstGeom>
+          <a:ln w="0">
+            <a:noFill/>
+          </a:ln>
+        </p:spPr>
+      </p:pic>
+      <p:pic>
+        <p:nvPicPr>
+          <p:cNvPr id="108" name="" descr=""/>
+          <p:cNvPicPr/>
+          <p:nvPr/>
+        </p:nvPicPr>
+        <p:blipFill>
+          <a:blip r:embed="rId4"/>
+          <a:stretch/>
+        </p:blipFill>
+        <p:spPr>
+          <a:xfrm>
+            <a:off x="5943600" y="1338120"/>
+            <a:ext cx="2971800" cy="2548080"/>
+          </a:xfrm>
+          <a:prstGeom prst="rect">
+            <a:avLst/>
+          </a:prstGeom>
+          <a:ln w="0">
+            <a:noFill/>
+          </a:ln>
+        </p:spPr>
+      </p:pic>
+      <p:pic>
+        <p:nvPicPr>
+          <p:cNvPr id="109" name="" descr=""/>
+          <p:cNvPicPr/>
+          <p:nvPr/>
+        </p:nvPicPr>
+        <p:blipFill>
+          <a:blip r:embed="rId5"/>
+          <a:stretch/>
+        </p:blipFill>
+        <p:spPr>
+          <a:xfrm>
+            <a:off x="2971800" y="1303920"/>
+            <a:ext cx="2971800" cy="2582280"/>
+          </a:xfrm>
+          <a:prstGeom prst="rect">
+            <a:avLst/>
+          </a:prstGeom>
+          <a:ln w="0">
+            <a:noFill/>
+          </a:ln>
+        </p:spPr>
+      </p:pic>
+      <p:pic>
+        <p:nvPicPr>
+          <p:cNvPr id="110" name="" descr=""/>
+          <p:cNvPicPr/>
+          <p:nvPr/>
+        </p:nvPicPr>
+        <p:blipFill>
+          <a:blip r:embed="rId6"/>
+          <a:stretch/>
+        </p:blipFill>
+        <p:spPr>
+          <a:xfrm>
+            <a:off x="0" y="1303560"/>
+            <a:ext cx="2971800" cy="2582640"/>
+          </a:xfrm>
+          <a:prstGeom prst="rect">
+            <a:avLst/>
+          </a:prstGeom>
+          <a:ln w="0">
+            <a:noFill/>
+          </a:ln>
+        </p:spPr>
+      </p:pic>
+      <p:sp>
+        <p:nvSpPr>
+          <p:cNvPr id="111" name=""/>
+          <p:cNvSpPr txBox="1"/>
+          <p:nvPr/>
+        </p:nvSpPr>
+        <p:spPr>
+          <a:xfrm>
+            <a:off x="81360" y="0"/>
+            <a:ext cx="4033440" cy="355680"/>
+          </a:xfrm>
+          <a:prstGeom prst="rect">
+            <a:avLst/>
+          </a:prstGeom>
+          <a:noFill/>
+          <a:ln w="0">
+            <a:noFill/>
+          </a:ln>
+        </p:spPr>
+        <p:txBody>
+          <a:bodyPr wrap="none" lIns="90000" rIns="90000" tIns="45000" bIns="45000" anchor="t">
+            <a:noAutofit/>
+          </a:bodyPr>
+          <a:p>
+            <a:r>
+              <a:rPr b="0" lang="en-US" sz="1800" spc="-1" strike="noStrike">
+                <a:solidFill>
+                  <a:srgbClr val="000000"/>
+                </a:solidFill>
+                <a:latin typeface="Consolas;Courier"/>
+                <a:ea typeface="Consolas;Courier"/>
+              </a:rPr>
+              <a:t>constraints = [constraints];</a:t>
+            </a:r>
+            <a:endParaRPr b="0" lang="en-US" sz="1800" spc="-1" strike="noStrike">
+              <a:solidFill>
+                <a:srgbClr val="000000"/>
+              </a:solidFill>
+              <a:latin typeface="Consolas;Courier"/>
+              <a:ea typeface="Consolas;Courier"/>
+            </a:endParaRPr>
+          </a:p>
+        </p:txBody>
+      </p:sp>
     </p:spTree>
   </p:cSld>
   <mc:AlternateContent>
@@ -6832,7 +7427,7 @@
         <p:spPr>
           <a:xfrm>
             <a:off x="838080" y="365040"/>
-            <a:ext cx="10514880" cy="1324800"/>
+            <a:ext cx="10514520" cy="1324440"/>
           </a:xfrm>
           <a:prstGeom prst="rect">
             <a:avLst/>
@@ -6900,9 +7495,9 @@
             </a:br>
             <a:endParaRPr b="0" lang="en-US" sz="1800" spc="-1" strike="noStrike">
               <a:solidFill>
-                <a:schemeClr val="dk1"/>
-              </a:solidFill>
-              <a:latin typeface="Aptos"/>
+                <a:srgbClr val="000000"/>
+              </a:solidFill>
+              <a:latin typeface="Arial"/>
             </a:endParaRPr>
           </a:p>
         </p:txBody>
@@ -6920,7 +7515,7 @@
         <p:spPr>
           <a:xfrm>
             <a:off x="0" y="1132560"/>
-            <a:ext cx="12191400" cy="6063480"/>
+            <a:ext cx="12191040" cy="6063120"/>
           </a:xfrm>
           <a:prstGeom prst="rect">
             <a:avLst/>
@@ -6973,7 +7568,7 @@
         <p:spPr>
           <a:xfrm>
             <a:off x="838080" y="365040"/>
-            <a:ext cx="10514880" cy="1324800"/>
+            <a:ext cx="10514520" cy="1324440"/>
           </a:xfrm>
           <a:prstGeom prst="rect">
             <a:avLst/>
@@ -7008,9 +7603,9 @@
             </a:r>
             <a:endParaRPr b="0" lang="en-US" sz="4400" spc="-1" strike="noStrike">
               <a:solidFill>
-                <a:schemeClr val="dk1"/>
-              </a:solidFill>
-              <a:latin typeface="Aptos"/>
+                <a:srgbClr val="000000"/>
+              </a:solidFill>
+              <a:latin typeface="Arial"/>
             </a:endParaRPr>
           </a:p>
         </p:txBody>
@@ -7028,7 +7623,7 @@
         <p:spPr>
           <a:xfrm>
             <a:off x="-500400" y="916560"/>
-            <a:ext cx="12191400" cy="6063480"/>
+            <a:ext cx="12191040" cy="6063120"/>
           </a:xfrm>
           <a:prstGeom prst="rect">
             <a:avLst/>
@@ -7081,7 +7676,7 @@
         <p:spPr>
           <a:xfrm>
             <a:off x="838080" y="365040"/>
-            <a:ext cx="10514880" cy="1324800"/>
+            <a:ext cx="10514520" cy="1324440"/>
           </a:xfrm>
           <a:prstGeom prst="rect">
             <a:avLst/>
@@ -7116,9 +7711,9 @@
             </a:r>
             <a:endParaRPr b="0" lang="en-US" sz="4400" spc="-1" strike="noStrike">
               <a:solidFill>
-                <a:schemeClr val="dk1"/>
-              </a:solidFill>
-              <a:latin typeface="Aptos"/>
+                <a:srgbClr val="000000"/>
+              </a:solidFill>
+              <a:latin typeface="Arial"/>
             </a:endParaRPr>
           </a:p>
         </p:txBody>
@@ -7136,7 +7731,7 @@
         <p:spPr>
           <a:xfrm>
             <a:off x="3681360" y="1881360"/>
-            <a:ext cx="4961880" cy="3723480"/>
+            <a:ext cx="4961520" cy="3723120"/>
           </a:xfrm>
           <a:prstGeom prst="rect">
             <a:avLst/>
@@ -7189,7 +7784,7 @@
         <p:spPr>
           <a:xfrm>
             <a:off x="838080" y="365040"/>
-            <a:ext cx="10514880" cy="1324800"/>
+            <a:ext cx="10514520" cy="1324440"/>
           </a:xfrm>
           <a:prstGeom prst="rect">
             <a:avLst/>
@@ -7224,9 +7819,9 @@
             </a:r>
             <a:endParaRPr b="0" lang="en-US" sz="4400" spc="-1" strike="noStrike">
               <a:solidFill>
-                <a:schemeClr val="dk1"/>
-              </a:solidFill>
-              <a:latin typeface="Aptos"/>
+                <a:srgbClr val="000000"/>
+              </a:solidFill>
+              <a:latin typeface="Arial"/>
             </a:endParaRPr>
           </a:p>
         </p:txBody>
@@ -7244,7 +7839,7 @@
         <p:spPr>
           <a:xfrm>
             <a:off x="3614760" y="2347920"/>
-            <a:ext cx="4961880" cy="3723480"/>
+            <a:ext cx="4961520" cy="3723120"/>
           </a:xfrm>
           <a:prstGeom prst="rect">
             <a:avLst/>
@@ -7297,7 +7892,7 @@
         <p:spPr>
           <a:xfrm>
             <a:off x="838080" y="365040"/>
-            <a:ext cx="10514880" cy="1324800"/>
+            <a:ext cx="10514520" cy="1324440"/>
           </a:xfrm>
           <a:prstGeom prst="rect">
             <a:avLst/>
@@ -7332,9 +7927,9 @@
             </a:r>
             <a:endParaRPr b="0" lang="en-US" sz="4400" spc="-1" strike="noStrike">
               <a:solidFill>
-                <a:schemeClr val="dk1"/>
-              </a:solidFill>
-              <a:latin typeface="Aptos"/>
+                <a:srgbClr val="000000"/>
+              </a:solidFill>
+              <a:latin typeface="Arial"/>
             </a:endParaRPr>
           </a:p>
         </p:txBody>
@@ -7352,7 +7947,7 @@
         <p:spPr>
           <a:xfrm>
             <a:off x="3429000" y="2171880"/>
-            <a:ext cx="5333400" cy="3999960"/>
+            <a:ext cx="5333040" cy="3999600"/>
           </a:xfrm>
           <a:prstGeom prst="rect">
             <a:avLst/>
@@ -7405,7 +8000,7 @@
         <p:spPr>
           <a:xfrm>
             <a:off x="838080" y="365040"/>
-            <a:ext cx="10514880" cy="1324800"/>
+            <a:ext cx="10514520" cy="1324440"/>
           </a:xfrm>
           <a:prstGeom prst="rect">
             <a:avLst/>
@@ -7440,9 +8035,9 @@
             </a:r>
             <a:endParaRPr b="0" lang="en-US" sz="4400" spc="-1" strike="noStrike">
               <a:solidFill>
-                <a:schemeClr val="dk1"/>
-              </a:solidFill>
-              <a:latin typeface="Aptos"/>
+                <a:srgbClr val="000000"/>
+              </a:solidFill>
+              <a:latin typeface="Arial"/>
             </a:endParaRPr>
           </a:p>
         </p:txBody>
@@ -7460,7 +8055,7 @@
         <p:spPr>
           <a:xfrm>
             <a:off x="3105360" y="2028960"/>
-            <a:ext cx="5333400" cy="3999960"/>
+            <a:ext cx="5333040" cy="3999600"/>
           </a:xfrm>
           <a:prstGeom prst="rect">
             <a:avLst/>
@@ -7513,7 +8108,7 @@
         <p:spPr>
           <a:xfrm>
             <a:off x="838080" y="365040"/>
-            <a:ext cx="10514880" cy="1324800"/>
+            <a:ext cx="10514520" cy="1324440"/>
           </a:xfrm>
           <a:prstGeom prst="rect">
             <a:avLst/>
@@ -7548,9 +8143,9 @@
             </a:r>
             <a:endParaRPr b="0" lang="en-US" sz="4400" spc="-1" strike="noStrike">
               <a:solidFill>
-                <a:schemeClr val="dk1"/>
-              </a:solidFill>
-              <a:latin typeface="Aptos"/>
+                <a:srgbClr val="000000"/>
+              </a:solidFill>
+              <a:latin typeface="Arial"/>
             </a:endParaRPr>
           </a:p>
         </p:txBody>
@@ -7568,7 +8163,7 @@
         <p:spPr>
           <a:xfrm>
             <a:off x="3809880" y="2514600"/>
-            <a:ext cx="3961800" cy="2971080"/>
+            <a:ext cx="3961440" cy="2970720"/>
           </a:xfrm>
           <a:prstGeom prst="rect">
             <a:avLst/>

</xml_diff>